<commit_message>
Presubmitted changed to powerpoint and doc
</commit_message>
<xml_diff>
--- a/Medaction-XNAT.pptx
+++ b/Medaction-XNAT.pptx
@@ -5899,10 +5899,24 @@
     <dgm:pt modelId="{A69B64AF-FC74-7443-9D26-71783C5D230E}" type="pres">
       <dgm:prSet presAssocID="{7F0ABBEF-336F-E741-84B0-BFB4BD67C72E}" presName="sibTrans" presStyleLbl="sibTrans2D1" presStyleIdx="0" presStyleCnt="2"/>
       <dgm:spPr/>
+      <dgm:t>
+        <a:bodyPr/>
+        <a:lstStyle/>
+        <a:p>
+          <a:endParaRPr lang="en-US"/>
+        </a:p>
+      </dgm:t>
     </dgm:pt>
     <dgm:pt modelId="{AF29F09D-60C1-164C-830A-D02350F72B68}" type="pres">
       <dgm:prSet presAssocID="{7F0ABBEF-336F-E741-84B0-BFB4BD67C72E}" presName="connTx" presStyleLbl="sibTrans2D1" presStyleIdx="0" presStyleCnt="2"/>
       <dgm:spPr/>
+      <dgm:t>
+        <a:bodyPr/>
+        <a:lstStyle/>
+        <a:p>
+          <a:endParaRPr lang="en-US"/>
+        </a:p>
+      </dgm:t>
     </dgm:pt>
     <dgm:pt modelId="{2650D35C-7E93-A949-BD91-356B08AF89EC}" type="pres">
       <dgm:prSet presAssocID="{B29BE117-0CC9-034B-8F1E-0E1C4ECFA1CB}" presName="composite" presStyleCnt="0"/>
@@ -6022,30 +6036,30 @@
     </dgm:pt>
   </dgm:ptLst>
   <dgm:cxnLst>
-    <dgm:cxn modelId="{FBF65E4D-A647-DC46-BBDF-061AFDE32FC6}" type="presOf" srcId="{B29BE117-0CC9-034B-8F1E-0E1C4ECFA1CB}" destId="{9319FFC4-882B-3749-88D9-A87C85AF42F1}" srcOrd="0" destOrd="0" presId="urn:microsoft.com/office/officeart/2005/8/layout/process3"/>
-    <dgm:cxn modelId="{FD4358AC-6D94-B84A-9A07-780459DED5D9}" type="presOf" srcId="{86853A98-1CA2-4F4F-890D-6F8F49DC2DCE}" destId="{A3E567FF-3547-5546-80E0-BFA498A9F9FD}" srcOrd="0" destOrd="0" presId="urn:microsoft.com/office/officeart/2005/8/layout/process3"/>
-    <dgm:cxn modelId="{C501E8CC-37C2-E94F-AB59-D232AFC6C0D9}" srcId="{08370132-6D12-534D-8725-A137D0248FBA}" destId="{5E0C188A-880D-2540-878D-0E6D4EADC4C3}" srcOrd="0" destOrd="0" parTransId="{0272131E-A57C-8A43-987F-DFCD450A9327}" sibTransId="{7F0ABBEF-336F-E741-84B0-BFB4BD67C72E}"/>
+    <dgm:cxn modelId="{A3DDE3A5-C1E3-E646-B5CC-96B3A1168026}" type="presOf" srcId="{D29C8B3E-5A05-3E40-9F31-D48F7D764090}" destId="{39944B44-8BB3-784A-A888-3A4BAFEBE1A9}" srcOrd="0" destOrd="0" presId="urn:microsoft.com/office/officeart/2005/8/layout/process3"/>
+    <dgm:cxn modelId="{0AE5EFB1-4890-EF48-8E2E-FC62BEBE2634}" srcId="{D29C8B3E-5A05-3E40-9F31-D48F7D764090}" destId="{46BB3763-04DB-3A4D-8DBB-E65DDF28D55D}" srcOrd="1" destOrd="0" parTransId="{09223B91-E436-A240-83B1-27CFDCF7FBCF}" sibTransId="{7F8E09AF-D4B4-6B4D-84B3-53CF692B2764}"/>
+    <dgm:cxn modelId="{26823F72-F73B-D448-BC1E-2DAE9CE32A17}" type="presOf" srcId="{08370132-6D12-534D-8725-A137D0248FBA}" destId="{21AE8C12-74A0-D24C-BD74-B619D5440628}" srcOrd="0" destOrd="0" presId="urn:microsoft.com/office/officeart/2005/8/layout/process3"/>
+    <dgm:cxn modelId="{AFD6B68D-9112-1F4E-BA8E-92AE5FF686C6}" type="presOf" srcId="{870FE307-5DAC-5F45-9E5B-B83C12A9DEC2}" destId="{FDBA4910-F366-4C4A-9546-8D9B5F1E8E08}" srcOrd="0" destOrd="0" presId="urn:microsoft.com/office/officeart/2005/8/layout/process3"/>
+    <dgm:cxn modelId="{E8F12078-9CF3-D04B-9907-60868758921B}" type="presOf" srcId="{5E0C188A-880D-2540-878D-0E6D4EADC4C3}" destId="{6874D0DE-20BF-524A-A67B-543E5B922DD9}" srcOrd="1" destOrd="0" presId="urn:microsoft.com/office/officeart/2005/8/layout/process3"/>
     <dgm:cxn modelId="{2FB91AAC-3A0F-3645-855F-4249D7CD6D2D}" type="presOf" srcId="{560EA4AE-84B3-344E-95C6-42D7F136163D}" destId="{935BF702-BBEB-114D-A79C-AF7CCE50DEE2}" srcOrd="0" destOrd="0" presId="urn:microsoft.com/office/officeart/2005/8/layout/process3"/>
-    <dgm:cxn modelId="{7124E8FC-A838-3747-BECE-FAF3F7A789EA}" srcId="{5E0C188A-880D-2540-878D-0E6D4EADC4C3}" destId="{9FDAE9C1-ACA2-B04A-B64B-759EAFB7AD01}" srcOrd="0" destOrd="0" parTransId="{C609F7E3-6669-BB45-81B2-760BDDB2128A}" sibTransId="{58DF8909-AA3D-A14F-AD01-16B623A846E9}"/>
-    <dgm:cxn modelId="{5246606B-1A0A-DF4B-815C-5F49AF4A7416}" srcId="{08370132-6D12-534D-8725-A137D0248FBA}" destId="{D29C8B3E-5A05-3E40-9F31-D48F7D764090}" srcOrd="2" destOrd="0" parTransId="{CEACB662-F981-4644-AA76-2EFA6876E042}" sibTransId="{D418167B-1207-D448-A6C9-0F1B012FF9E8}"/>
-    <dgm:cxn modelId="{AFD6B68D-9112-1F4E-BA8E-92AE5FF686C6}" type="presOf" srcId="{870FE307-5DAC-5F45-9E5B-B83C12A9DEC2}" destId="{FDBA4910-F366-4C4A-9546-8D9B5F1E8E08}" srcOrd="0" destOrd="0" presId="urn:microsoft.com/office/officeart/2005/8/layout/process3"/>
+    <dgm:cxn modelId="{F7BC8E3F-56F9-924F-A286-8EFA9497F8A6}" type="presOf" srcId="{9FDAE9C1-ACA2-B04A-B64B-759EAFB7AD01}" destId="{14B57731-6E43-3F47-B8ED-B8A65514AD8F}" srcOrd="0" destOrd="0" presId="urn:microsoft.com/office/officeart/2005/8/layout/process3"/>
+    <dgm:cxn modelId="{22B88616-03B7-3248-B36A-51AB420A8A2E}" srcId="{08370132-6D12-534D-8725-A137D0248FBA}" destId="{B29BE117-0CC9-034B-8F1E-0E1C4ECFA1CB}" srcOrd="1" destOrd="0" parTransId="{8E748485-CD54-5746-AA7E-A8FCBE59807B}" sibTransId="{870FE307-5DAC-5F45-9E5B-B83C12A9DEC2}"/>
+    <dgm:cxn modelId="{5EF77E12-D9EF-774D-AAA8-BBF470E6E198}" srcId="{B29BE117-0CC9-034B-8F1E-0E1C4ECFA1CB}" destId="{560EA4AE-84B3-344E-95C6-42D7F136163D}" srcOrd="0" destOrd="0" parTransId="{4963E0FE-4C39-FD4C-9DE2-458A58B12882}" sibTransId="{F2831E12-15D8-E941-BB0D-15A714BFCCCA}"/>
     <dgm:cxn modelId="{8245AA9F-A13A-9849-8911-3D22592C3EA5}" srcId="{B29BE117-0CC9-034B-8F1E-0E1C4ECFA1CB}" destId="{1333B558-2A80-2B47-8C56-EEE368F6F976}" srcOrd="1" destOrd="0" parTransId="{3E895C9F-AF05-224E-AFA7-0E686A69C5BA}" sibTransId="{9BFE562D-DADC-1D4D-9BA9-AC32C672CA77}"/>
-    <dgm:cxn modelId="{9DDAC46E-E77C-1D45-9E91-61F8C1A91647}" type="presOf" srcId="{46BB3763-04DB-3A4D-8DBB-E65DDF28D55D}" destId="{A3E567FF-3547-5546-80E0-BFA498A9F9FD}" srcOrd="0" destOrd="1" presId="urn:microsoft.com/office/officeart/2005/8/layout/process3"/>
     <dgm:cxn modelId="{4C4779CF-CFDE-D142-9875-2E6E8D93AF55}" type="presOf" srcId="{1333B558-2A80-2B47-8C56-EEE368F6F976}" destId="{935BF702-BBEB-114D-A79C-AF7CCE50DEE2}" srcOrd="0" destOrd="1" presId="urn:microsoft.com/office/officeart/2005/8/layout/process3"/>
     <dgm:cxn modelId="{74A4947E-2318-694E-9992-8288C699A4DB}" type="presOf" srcId="{D29C8B3E-5A05-3E40-9F31-D48F7D764090}" destId="{4FA2F0AE-7622-9C4C-8DAE-9227BAF35588}" srcOrd="1" destOrd="0" presId="urn:microsoft.com/office/officeart/2005/8/layout/process3"/>
-    <dgm:cxn modelId="{F7BC8E3F-56F9-924F-A286-8EFA9497F8A6}" type="presOf" srcId="{9FDAE9C1-ACA2-B04A-B64B-759EAFB7AD01}" destId="{14B57731-6E43-3F47-B8ED-B8A65514AD8F}" srcOrd="0" destOrd="0" presId="urn:microsoft.com/office/officeart/2005/8/layout/process3"/>
+    <dgm:cxn modelId="{9DDAC46E-E77C-1D45-9E91-61F8C1A91647}" type="presOf" srcId="{46BB3763-04DB-3A4D-8DBB-E65DDF28D55D}" destId="{A3E567FF-3547-5546-80E0-BFA498A9F9FD}" srcOrd="0" destOrd="1" presId="urn:microsoft.com/office/officeart/2005/8/layout/process3"/>
+    <dgm:cxn modelId="{482E061E-A1A9-2949-806B-C8985481D573}" type="presOf" srcId="{7F0ABBEF-336F-E741-84B0-BFB4BD67C72E}" destId="{A69B64AF-FC74-7443-9D26-71783C5D230E}" srcOrd="0" destOrd="0" presId="urn:microsoft.com/office/officeart/2005/8/layout/process3"/>
+    <dgm:cxn modelId="{3D21017D-A4CE-5146-A463-D776163005D6}" type="presOf" srcId="{7F0ABBEF-336F-E741-84B0-BFB4BD67C72E}" destId="{AF29F09D-60C1-164C-830A-D02350F72B68}" srcOrd="1" destOrd="0" presId="urn:microsoft.com/office/officeart/2005/8/layout/process3"/>
+    <dgm:cxn modelId="{FC60DB97-684D-384A-80E3-D4BB1218074D}" type="presOf" srcId="{B29BE117-0CC9-034B-8F1E-0E1C4ECFA1CB}" destId="{8C24E9A9-AAA9-314C-9DD8-337A1173F821}" srcOrd="1" destOrd="0" presId="urn:microsoft.com/office/officeart/2005/8/layout/process3"/>
+    <dgm:cxn modelId="{7124E8FC-A838-3747-BECE-FAF3F7A789EA}" srcId="{5E0C188A-880D-2540-878D-0E6D4EADC4C3}" destId="{9FDAE9C1-ACA2-B04A-B64B-759EAFB7AD01}" srcOrd="0" destOrd="0" parTransId="{C609F7E3-6669-BB45-81B2-760BDDB2128A}" sibTransId="{58DF8909-AA3D-A14F-AD01-16B623A846E9}"/>
+    <dgm:cxn modelId="{A5CC7225-9DF7-EB4A-96D6-FB99205B700D}" type="presOf" srcId="{5E0C188A-880D-2540-878D-0E6D4EADC4C3}" destId="{D001C8D3-8493-0442-A258-1D5E1CAE0BBA}" srcOrd="0" destOrd="0" presId="urn:microsoft.com/office/officeart/2005/8/layout/process3"/>
     <dgm:cxn modelId="{0E55199D-21E8-324D-B4C4-E4E32EB39B68}" type="presOf" srcId="{870FE307-5DAC-5F45-9E5B-B83C12A9DEC2}" destId="{CF03150B-C0B6-524E-9FBB-F4ABF9BA56FA}" srcOrd="1" destOrd="0" presId="urn:microsoft.com/office/officeart/2005/8/layout/process3"/>
-    <dgm:cxn modelId="{22B88616-03B7-3248-B36A-51AB420A8A2E}" srcId="{08370132-6D12-534D-8725-A137D0248FBA}" destId="{B29BE117-0CC9-034B-8F1E-0E1C4ECFA1CB}" srcOrd="1" destOrd="0" parTransId="{8E748485-CD54-5746-AA7E-A8FCBE59807B}" sibTransId="{870FE307-5DAC-5F45-9E5B-B83C12A9DEC2}"/>
+    <dgm:cxn modelId="{FBF65E4D-A647-DC46-BBDF-061AFDE32FC6}" type="presOf" srcId="{B29BE117-0CC9-034B-8F1E-0E1C4ECFA1CB}" destId="{9319FFC4-882B-3749-88D9-A87C85AF42F1}" srcOrd="0" destOrd="0" presId="urn:microsoft.com/office/officeart/2005/8/layout/process3"/>
+    <dgm:cxn modelId="{5246606B-1A0A-DF4B-815C-5F49AF4A7416}" srcId="{08370132-6D12-534D-8725-A137D0248FBA}" destId="{D29C8B3E-5A05-3E40-9F31-D48F7D764090}" srcOrd="2" destOrd="0" parTransId="{CEACB662-F981-4644-AA76-2EFA6876E042}" sibTransId="{D418167B-1207-D448-A6C9-0F1B012FF9E8}"/>
+    <dgm:cxn modelId="{FD4358AC-6D94-B84A-9A07-780459DED5D9}" type="presOf" srcId="{86853A98-1CA2-4F4F-890D-6F8F49DC2DCE}" destId="{A3E567FF-3547-5546-80E0-BFA498A9F9FD}" srcOrd="0" destOrd="0" presId="urn:microsoft.com/office/officeart/2005/8/layout/process3"/>
     <dgm:cxn modelId="{77A0B6EE-F707-9347-B43D-DADF195C7E14}" srcId="{D29C8B3E-5A05-3E40-9F31-D48F7D764090}" destId="{86853A98-1CA2-4F4F-890D-6F8F49DC2DCE}" srcOrd="0" destOrd="0" parTransId="{C2ACB915-9C2A-2D4D-961C-4DE42B2D76A0}" sibTransId="{4C2DC2BB-BB33-CF40-8F84-22D719851411}"/>
-    <dgm:cxn modelId="{5EF77E12-D9EF-774D-AAA8-BBF470E6E198}" srcId="{B29BE117-0CC9-034B-8F1E-0E1C4ECFA1CB}" destId="{560EA4AE-84B3-344E-95C6-42D7F136163D}" srcOrd="0" destOrd="0" parTransId="{4963E0FE-4C39-FD4C-9DE2-458A58B12882}" sibTransId="{F2831E12-15D8-E941-BB0D-15A714BFCCCA}"/>
-    <dgm:cxn modelId="{FC60DB97-684D-384A-80E3-D4BB1218074D}" type="presOf" srcId="{B29BE117-0CC9-034B-8F1E-0E1C4ECFA1CB}" destId="{8C24E9A9-AAA9-314C-9DD8-337A1173F821}" srcOrd="1" destOrd="0" presId="urn:microsoft.com/office/officeart/2005/8/layout/process3"/>
-    <dgm:cxn modelId="{0AE5EFB1-4890-EF48-8E2E-FC62BEBE2634}" srcId="{D29C8B3E-5A05-3E40-9F31-D48F7D764090}" destId="{46BB3763-04DB-3A4D-8DBB-E65DDF28D55D}" srcOrd="1" destOrd="0" parTransId="{09223B91-E436-A240-83B1-27CFDCF7FBCF}" sibTransId="{7F8E09AF-D4B4-6B4D-84B3-53CF692B2764}"/>
-    <dgm:cxn modelId="{3D21017D-A4CE-5146-A463-D776163005D6}" type="presOf" srcId="{7F0ABBEF-336F-E741-84B0-BFB4BD67C72E}" destId="{AF29F09D-60C1-164C-830A-D02350F72B68}" srcOrd="1" destOrd="0" presId="urn:microsoft.com/office/officeart/2005/8/layout/process3"/>
-    <dgm:cxn modelId="{26823F72-F73B-D448-BC1E-2DAE9CE32A17}" type="presOf" srcId="{08370132-6D12-534D-8725-A137D0248FBA}" destId="{21AE8C12-74A0-D24C-BD74-B619D5440628}" srcOrd="0" destOrd="0" presId="urn:microsoft.com/office/officeart/2005/8/layout/process3"/>
-    <dgm:cxn modelId="{A3DDE3A5-C1E3-E646-B5CC-96B3A1168026}" type="presOf" srcId="{D29C8B3E-5A05-3E40-9F31-D48F7D764090}" destId="{39944B44-8BB3-784A-A888-3A4BAFEBE1A9}" srcOrd="0" destOrd="0" presId="urn:microsoft.com/office/officeart/2005/8/layout/process3"/>
-    <dgm:cxn modelId="{482E061E-A1A9-2949-806B-C8985481D573}" type="presOf" srcId="{7F0ABBEF-336F-E741-84B0-BFB4BD67C72E}" destId="{A69B64AF-FC74-7443-9D26-71783C5D230E}" srcOrd="0" destOrd="0" presId="urn:microsoft.com/office/officeart/2005/8/layout/process3"/>
-    <dgm:cxn modelId="{E8F12078-9CF3-D04B-9907-60868758921B}" type="presOf" srcId="{5E0C188A-880D-2540-878D-0E6D4EADC4C3}" destId="{6874D0DE-20BF-524A-A67B-543E5B922DD9}" srcOrd="1" destOrd="0" presId="urn:microsoft.com/office/officeart/2005/8/layout/process3"/>
-    <dgm:cxn modelId="{A5CC7225-9DF7-EB4A-96D6-FB99205B700D}" type="presOf" srcId="{5E0C188A-880D-2540-878D-0E6D4EADC4C3}" destId="{D001C8D3-8493-0442-A258-1D5E1CAE0BBA}" srcOrd="0" destOrd="0" presId="urn:microsoft.com/office/officeart/2005/8/layout/process3"/>
+    <dgm:cxn modelId="{C501E8CC-37C2-E94F-AB59-D232AFC6C0D9}" srcId="{08370132-6D12-534D-8725-A137D0248FBA}" destId="{5E0C188A-880D-2540-878D-0E6D4EADC4C3}" srcOrd="0" destOrd="0" parTransId="{0272131E-A57C-8A43-987F-DFCD450A9327}" sibTransId="{7F0ABBEF-336F-E741-84B0-BFB4BD67C72E}"/>
     <dgm:cxn modelId="{D45584E3-022D-9C48-8A96-3BF18880A636}" type="presParOf" srcId="{21AE8C12-74A0-D24C-BD74-B619D5440628}" destId="{C9233862-3D5C-314E-8A0A-28C3C602274B}" srcOrd="0" destOrd="0" presId="urn:microsoft.com/office/officeart/2005/8/layout/process3"/>
     <dgm:cxn modelId="{D15C9E36-0E05-754F-AD83-2258FF8FF50A}" type="presParOf" srcId="{C9233862-3D5C-314E-8A0A-28C3C602274B}" destId="{D001C8D3-8493-0442-A258-1D5E1CAE0BBA}" srcOrd="0" destOrd="0" presId="urn:microsoft.com/office/officeart/2005/8/layout/process3"/>
     <dgm:cxn modelId="{6DF09792-E5BA-DF4C-9FD8-0E910061F208}" type="presParOf" srcId="{C9233862-3D5C-314E-8A0A-28C3C602274B}" destId="{6874D0DE-20BF-524A-A67B-543E5B922DD9}" srcOrd="1" destOrd="0" presId="urn:microsoft.com/office/officeart/2005/8/layout/process3"/>
@@ -6261,11 +6275,7 @@
         <a:p>
           <a:r>
             <a:rPr lang="en-US" dirty="0" smtClean="0"/>
-            <a:t>Patient Health </a:t>
-          </a:r>
-          <a:r>
-            <a:rPr lang="en-US" dirty="0" smtClean="0"/>
-            <a:t>Information </a:t>
+            <a:t>Patient Health Information </a:t>
           </a:r>
           <a:endParaRPr lang="en-US" dirty="0"/>
         </a:p>
@@ -6376,11 +6386,7 @@
         <a:p>
           <a:r>
             <a:rPr lang="en-US" dirty="0" smtClean="0"/>
-            <a:t>Subject</a:t>
-          </a:r>
-          <a:r>
-            <a:rPr lang="en-US" dirty="0" smtClean="0"/>
-            <a:t> trust</a:t>
+            <a:t>Subject trust</a:t>
           </a:r>
           <a:endParaRPr lang="en-US" dirty="0"/>
         </a:p>
@@ -7064,14 +7070,14 @@
     <dgm:cxn modelId="{9B829CD3-DEE2-974D-A649-DB74A944C5C4}" srcId="{570875CF-80D1-8C4F-8546-E34D520CD080}" destId="{962CDB59-1758-3844-A3F5-E93352C2896A}" srcOrd="0" destOrd="0" parTransId="{636E9687-3B48-604B-9865-01DC6FDA805C}" sibTransId="{C7A74D52-8C91-9445-87CB-932A46E9E295}"/>
     <dgm:cxn modelId="{CFCD4748-C44F-A44A-86B5-EFDB5D5C791A}" srcId="{570875CF-80D1-8C4F-8546-E34D520CD080}" destId="{4B6FA1E4-341F-F54F-A9AE-FAC823CA61BF}" srcOrd="1" destOrd="0" parTransId="{45EBBE08-D49F-9D4C-A02E-7EB95D34C542}" sibTransId="{C49DE4B6-0355-1D42-A290-57E855931C7E}"/>
     <dgm:cxn modelId="{DE40209C-7E6E-B94C-AAA8-DBBF6360253A}" srcId="{570875CF-80D1-8C4F-8546-E34D520CD080}" destId="{DE7B3FAF-673D-6545-93C6-E0EA37A409EB}" srcOrd="2" destOrd="0" parTransId="{318D68B3-A64F-4646-A2F9-3EC8570E425B}" sibTransId="{431BE8E7-3400-3445-AACD-97FD9EC4B202}"/>
+    <dgm:cxn modelId="{4E45CC95-5308-664D-87B9-B0BFC40770DE}" type="presOf" srcId="{570875CF-80D1-8C4F-8546-E34D520CD080}" destId="{21CB5038-B889-3247-8224-ADA196D47C94}" srcOrd="0" destOrd="0" presId="urn:microsoft.com/office/officeart/2005/8/layout/default"/>
     <dgm:cxn modelId="{FFBEF099-414C-B344-9319-D047E2E8649B}" srcId="{570875CF-80D1-8C4F-8546-E34D520CD080}" destId="{3A69CF19-6CA0-184A-99F1-F42186C8AB42}" srcOrd="3" destOrd="0" parTransId="{316A9CDD-CC60-D04C-B3DF-BE993FD3AFC1}" sibTransId="{00E9698E-12B9-1042-9DCD-9C5555C3A427}"/>
-    <dgm:cxn modelId="{4E45CC95-5308-664D-87B9-B0BFC40770DE}" type="presOf" srcId="{570875CF-80D1-8C4F-8546-E34D520CD080}" destId="{21CB5038-B889-3247-8224-ADA196D47C94}" srcOrd="0" destOrd="0" presId="urn:microsoft.com/office/officeart/2005/8/layout/default"/>
     <dgm:cxn modelId="{BBAADF3B-8C1D-8049-8415-70379F034457}" type="presOf" srcId="{1258307F-C23B-0845-8A22-4C964BEDAA95}" destId="{6C4D2F57-0AEA-3F40-B063-78A0BE7B3A93}" srcOrd="0" destOrd="0" presId="urn:microsoft.com/office/officeart/2005/8/layout/default"/>
     <dgm:cxn modelId="{1F9E765F-555F-CA47-B8A1-2BB6E70F7396}" type="presOf" srcId="{3A69CF19-6CA0-184A-99F1-F42186C8AB42}" destId="{FE3BD15A-F0BA-2B48-A860-76A8115E70CA}" srcOrd="0" destOrd="0" presId="urn:microsoft.com/office/officeart/2005/8/layout/default"/>
     <dgm:cxn modelId="{A750D74D-5F95-6244-946E-5A68242246C0}" srcId="{570875CF-80D1-8C4F-8546-E34D520CD080}" destId="{BBBE487F-D2A6-244C-9C62-9FE6B6CA268F}" srcOrd="5" destOrd="0" parTransId="{F286E376-4CBB-7A4B-9E8D-A4D35BD39A21}" sibTransId="{3E59B615-7152-B544-866B-A073B364E6B0}"/>
     <dgm:cxn modelId="{EB65066B-36A4-8742-8EE8-BAEA5DD072D2}" type="presOf" srcId="{4B6FA1E4-341F-F54F-A9AE-FAC823CA61BF}" destId="{068541F8-9255-D340-9055-486B817A0EC8}" srcOrd="0" destOrd="0" presId="urn:microsoft.com/office/officeart/2005/8/layout/default"/>
+    <dgm:cxn modelId="{0FC2315A-18C4-2B4C-84D3-178FAFCE9550}" type="presOf" srcId="{4FBE4E8C-6C19-C446-96AD-9AD30F7933C7}" destId="{87C014DF-E31B-7541-9F7B-C39943A01063}" srcOrd="0" destOrd="0" presId="urn:microsoft.com/office/officeart/2005/8/layout/default"/>
     <dgm:cxn modelId="{FC009F34-4D4E-CD42-8188-4ECA431E7584}" srcId="{570875CF-80D1-8C4F-8546-E34D520CD080}" destId="{4FBE4E8C-6C19-C446-96AD-9AD30F7933C7}" srcOrd="6" destOrd="0" parTransId="{9A9EA27B-8F61-FC43-A908-1C1E09404BDE}" sibTransId="{E3A461EC-285F-5247-BE66-2042CFCBC7C2}"/>
-    <dgm:cxn modelId="{0FC2315A-18C4-2B4C-84D3-178FAFCE9550}" type="presOf" srcId="{4FBE4E8C-6C19-C446-96AD-9AD30F7933C7}" destId="{87C014DF-E31B-7541-9F7B-C39943A01063}" srcOrd="0" destOrd="0" presId="urn:microsoft.com/office/officeart/2005/8/layout/default"/>
     <dgm:cxn modelId="{50966056-0D6C-5A4E-80C2-9B032AA0F2F2}" type="presOf" srcId="{BBBE487F-D2A6-244C-9C62-9FE6B6CA268F}" destId="{393D5D43-738C-F24C-9BD0-EF38F2EC6375}" srcOrd="0" destOrd="0" presId="urn:microsoft.com/office/officeart/2005/8/layout/default"/>
     <dgm:cxn modelId="{0593DC74-F7F8-104A-9040-D6EA62D06E20}" type="presParOf" srcId="{21CB5038-B889-3247-8224-ADA196D47C94}" destId="{FCCA6C2A-826D-A54E-824B-505AD09946D6}" srcOrd="0" destOrd="0" presId="urn:microsoft.com/office/officeart/2005/8/layout/default"/>
     <dgm:cxn modelId="{037B5F22-1537-4B4F-BD25-08F175DC4790}" type="presParOf" srcId="{21CB5038-B889-3247-8224-ADA196D47C94}" destId="{E88849BE-39A5-C044-85FD-4806DA24F4D7}" srcOrd="1" destOrd="0" presId="urn:microsoft.com/office/officeart/2005/8/layout/default"/>
@@ -8043,21 +8049,21 @@
     </dgm:pt>
   </dgm:ptLst>
   <dgm:cxnLst>
-    <dgm:cxn modelId="{205733C5-23A2-2E47-8C8E-4C85238C4038}" type="presOf" srcId="{1258307F-C23B-0845-8A22-4C964BEDAA95}" destId="{08A8B8AE-4E3E-E242-BA47-59EDF25A9874}" srcOrd="0" destOrd="0" presId="urn:microsoft.com/office/officeart/2005/8/layout/vList5"/>
-    <dgm:cxn modelId="{22695C57-F17F-9B41-80F4-1070BC9E2197}" type="presOf" srcId="{5BA4F31B-AF84-3942-B74B-A41663F88E51}" destId="{180A1957-8EF7-1D4A-9D83-58598AF6CC5A}" srcOrd="0" destOrd="0" presId="urn:microsoft.com/office/officeart/2005/8/layout/vList5"/>
+    <dgm:cxn modelId="{88DF0809-E59F-3446-8037-AA5FD8F3B58D}" type="presOf" srcId="{3A69CF19-6CA0-184A-99F1-F42186C8AB42}" destId="{E08AF1E0-9A76-EE4F-9F5F-B74AEF04862E}" srcOrd="0" destOrd="0" presId="urn:microsoft.com/office/officeart/2005/8/layout/vList5"/>
+    <dgm:cxn modelId="{FFBEF099-414C-B344-9319-D047E2E8649B}" srcId="{570875CF-80D1-8C4F-8546-E34D520CD080}" destId="{3A69CF19-6CA0-184A-99F1-F42186C8AB42}" srcOrd="3" destOrd="0" parTransId="{316A9CDD-CC60-D04C-B3DF-BE993FD3AFC1}" sibTransId="{00E9698E-12B9-1042-9DCD-9C5555C3A427}"/>
+    <dgm:cxn modelId="{D0052CD4-11A7-3642-97B5-795A32209C06}" type="presOf" srcId="{4FBE4E8C-6C19-C446-96AD-9AD30F7933C7}" destId="{5EDE6D45-6ED3-8947-87B1-B0B3F166606B}" srcOrd="0" destOrd="0" presId="urn:microsoft.com/office/officeart/2005/8/layout/vList5"/>
+    <dgm:cxn modelId="{D50F9398-AACA-604C-9C93-4C2B87337315}" type="presOf" srcId="{BBBE487F-D2A6-244C-9C62-9FE6B6CA268F}" destId="{ECD07891-7F05-D148-B742-473BD1FB827D}" srcOrd="0" destOrd="0" presId="urn:microsoft.com/office/officeart/2005/8/layout/vList5"/>
+    <dgm:cxn modelId="{B8196806-871E-7B48-80E2-253239F54779}" type="presOf" srcId="{962CDB59-1758-3844-A3F5-E93352C2896A}" destId="{9E5BD4DB-0A58-AC4D-BCEA-D3AA2D5035E5}" srcOrd="0" destOrd="0" presId="urn:microsoft.com/office/officeart/2005/8/layout/vList5"/>
+    <dgm:cxn modelId="{03EBCC34-C7F1-C649-B8E5-66BD97491BA5}" type="presOf" srcId="{4B6FA1E4-341F-F54F-A9AE-FAC823CA61BF}" destId="{CF3DB2E4-A4F8-824B-A9C6-38A81A4F7E90}" srcOrd="0" destOrd="0" presId="urn:microsoft.com/office/officeart/2005/8/layout/vList5"/>
     <dgm:cxn modelId="{FC009F34-4D4E-CD42-8188-4ECA431E7584}" srcId="{570875CF-80D1-8C4F-8546-E34D520CD080}" destId="{4FBE4E8C-6C19-C446-96AD-9AD30F7933C7}" srcOrd="6" destOrd="0" parTransId="{9A9EA27B-8F61-FC43-A908-1C1E09404BDE}" sibTransId="{E3A461EC-285F-5247-BE66-2042CFCBC7C2}"/>
-    <dgm:cxn modelId="{03EBCC34-C7F1-C649-B8E5-66BD97491BA5}" type="presOf" srcId="{4B6FA1E4-341F-F54F-A9AE-FAC823CA61BF}" destId="{CF3DB2E4-A4F8-824B-A9C6-38A81A4F7E90}" srcOrd="0" destOrd="0" presId="urn:microsoft.com/office/officeart/2005/8/layout/vList5"/>
+    <dgm:cxn modelId="{A750D74D-5F95-6244-946E-5A68242246C0}" srcId="{570875CF-80D1-8C4F-8546-E34D520CD080}" destId="{BBBE487F-D2A6-244C-9C62-9FE6B6CA268F}" srcOrd="5" destOrd="0" parTransId="{F286E376-4CBB-7A4B-9E8D-A4D35BD39A21}" sibTransId="{3E59B615-7152-B544-866B-A073B364E6B0}"/>
     <dgm:cxn modelId="{9B829CD3-DEE2-974D-A649-DB74A944C5C4}" srcId="{570875CF-80D1-8C4F-8546-E34D520CD080}" destId="{962CDB59-1758-3844-A3F5-E93352C2896A}" srcOrd="0" destOrd="0" parTransId="{636E9687-3B48-604B-9865-01DC6FDA805C}" sibTransId="{C7A74D52-8C91-9445-87CB-932A46E9E295}"/>
     <dgm:cxn modelId="{2F8CD622-CDC1-7F41-A672-0A43E092397B}" srcId="{570875CF-80D1-8C4F-8546-E34D520CD080}" destId="{5BA4F31B-AF84-3942-B74B-A41663F88E51}" srcOrd="2" destOrd="0" parTransId="{60F0EB3A-C748-AF4B-9276-5E94AD36FCBC}" sibTransId="{DCB69478-EEEF-FE43-811D-D56F9EBCBDED}"/>
     <dgm:cxn modelId="{E38543E3-6FBB-184C-B9AE-E6D40691A386}" srcId="{570875CF-80D1-8C4F-8546-E34D520CD080}" destId="{1258307F-C23B-0845-8A22-4C964BEDAA95}" srcOrd="4" destOrd="0" parTransId="{55D4D9FD-494C-7D44-8F19-A9FC17DF52A6}" sibTransId="{EEB76041-BB25-9A4D-8F07-BF17A967E8AE}"/>
-    <dgm:cxn modelId="{D0052CD4-11A7-3642-97B5-795A32209C06}" type="presOf" srcId="{4FBE4E8C-6C19-C446-96AD-9AD30F7933C7}" destId="{5EDE6D45-6ED3-8947-87B1-B0B3F166606B}" srcOrd="0" destOrd="0" presId="urn:microsoft.com/office/officeart/2005/8/layout/vList5"/>
-    <dgm:cxn modelId="{FFBEF099-414C-B344-9319-D047E2E8649B}" srcId="{570875CF-80D1-8C4F-8546-E34D520CD080}" destId="{3A69CF19-6CA0-184A-99F1-F42186C8AB42}" srcOrd="3" destOrd="0" parTransId="{316A9CDD-CC60-D04C-B3DF-BE993FD3AFC1}" sibTransId="{00E9698E-12B9-1042-9DCD-9C5555C3A427}"/>
-    <dgm:cxn modelId="{A750D74D-5F95-6244-946E-5A68242246C0}" srcId="{570875CF-80D1-8C4F-8546-E34D520CD080}" destId="{BBBE487F-D2A6-244C-9C62-9FE6B6CA268F}" srcOrd="5" destOrd="0" parTransId="{F286E376-4CBB-7A4B-9E8D-A4D35BD39A21}" sibTransId="{3E59B615-7152-B544-866B-A073B364E6B0}"/>
-    <dgm:cxn modelId="{D50F9398-AACA-604C-9C93-4C2B87337315}" type="presOf" srcId="{BBBE487F-D2A6-244C-9C62-9FE6B6CA268F}" destId="{ECD07891-7F05-D148-B742-473BD1FB827D}" srcOrd="0" destOrd="0" presId="urn:microsoft.com/office/officeart/2005/8/layout/vList5"/>
-    <dgm:cxn modelId="{B8196806-871E-7B48-80E2-253239F54779}" type="presOf" srcId="{962CDB59-1758-3844-A3F5-E93352C2896A}" destId="{9E5BD4DB-0A58-AC4D-BCEA-D3AA2D5035E5}" srcOrd="0" destOrd="0" presId="urn:microsoft.com/office/officeart/2005/8/layout/vList5"/>
     <dgm:cxn modelId="{CFCD4748-C44F-A44A-86B5-EFDB5D5C791A}" srcId="{570875CF-80D1-8C4F-8546-E34D520CD080}" destId="{4B6FA1E4-341F-F54F-A9AE-FAC823CA61BF}" srcOrd="1" destOrd="0" parTransId="{45EBBE08-D49F-9D4C-A02E-7EB95D34C542}" sibTransId="{C49DE4B6-0355-1D42-A290-57E855931C7E}"/>
     <dgm:cxn modelId="{EEBE4D23-48DF-7541-885A-E2812F5C5BCA}" type="presOf" srcId="{570875CF-80D1-8C4F-8546-E34D520CD080}" destId="{2DD62B43-7091-D74E-99B4-013F223577A6}" srcOrd="0" destOrd="0" presId="urn:microsoft.com/office/officeart/2005/8/layout/vList5"/>
-    <dgm:cxn modelId="{88DF0809-E59F-3446-8037-AA5FD8F3B58D}" type="presOf" srcId="{3A69CF19-6CA0-184A-99F1-F42186C8AB42}" destId="{E08AF1E0-9A76-EE4F-9F5F-B74AEF04862E}" srcOrd="0" destOrd="0" presId="urn:microsoft.com/office/officeart/2005/8/layout/vList5"/>
+    <dgm:cxn modelId="{205733C5-23A2-2E47-8C8E-4C85238C4038}" type="presOf" srcId="{1258307F-C23B-0845-8A22-4C964BEDAA95}" destId="{08A8B8AE-4E3E-E242-BA47-59EDF25A9874}" srcOrd="0" destOrd="0" presId="urn:microsoft.com/office/officeart/2005/8/layout/vList5"/>
+    <dgm:cxn modelId="{22695C57-F17F-9B41-80F4-1070BC9E2197}" type="presOf" srcId="{5BA4F31B-AF84-3942-B74B-A41663F88E51}" destId="{180A1957-8EF7-1D4A-9D83-58598AF6CC5A}" srcOrd="0" destOrd="0" presId="urn:microsoft.com/office/officeart/2005/8/layout/vList5"/>
     <dgm:cxn modelId="{4275AB34-90C6-3449-94FF-ED48DAC30C67}" type="presParOf" srcId="{2DD62B43-7091-D74E-99B4-013F223577A6}" destId="{29D8F2E3-1991-4647-BC1B-502C2D6717B7}" srcOrd="0" destOrd="0" presId="urn:microsoft.com/office/officeart/2005/8/layout/vList5"/>
     <dgm:cxn modelId="{D46B1C40-17EA-4249-8B92-89A2D7A5C9D2}" type="presParOf" srcId="{29D8F2E3-1991-4647-BC1B-502C2D6717B7}" destId="{9E5BD4DB-0A58-AC4D-BCEA-D3AA2D5035E5}" srcOrd="0" destOrd="0" presId="urn:microsoft.com/office/officeart/2005/8/layout/vList5"/>
     <dgm:cxn modelId="{A3E9FB92-E135-A64E-9697-BDEEBB7D80B0}" type="presParOf" srcId="{2DD62B43-7091-D74E-99B4-013F223577A6}" destId="{1E6F1CEE-E10C-6F42-8EA9-7C26C566D89A}" srcOrd="1" destOrd="0" presId="urn:microsoft.com/office/officeart/2005/8/layout/vList5"/>
@@ -8452,8 +8458,8 @@
     <dgm:cxn modelId="{28A68559-7916-E14D-8BE6-5B3B7B1774CB}" srcId="{570875CF-80D1-8C4F-8546-E34D520CD080}" destId="{F1414268-F654-B94E-9BEC-747894CC3524}" srcOrd="5" destOrd="0" parTransId="{89D708F3-11AC-4B45-852A-80B92D2B579A}" sibTransId="{D5B15346-3435-9B43-AAF9-994D7A0AB905}"/>
     <dgm:cxn modelId="{23F13290-D1AE-6A43-A871-16ED3B6D079B}" srcId="{570875CF-80D1-8C4F-8546-E34D520CD080}" destId="{2FFA3350-A412-E84A-B7A1-5CA608AFC879}" srcOrd="4" destOrd="0" parTransId="{F6AE4945-BDDD-454E-8198-A3888FE9141C}" sibTransId="{35D0B729-468B-6543-B1DD-68D75B5E3B15}"/>
     <dgm:cxn modelId="{84BD90F2-DE4C-3741-9B5D-02AB6E450462}" type="presOf" srcId="{962CDB59-1758-3844-A3F5-E93352C2896A}" destId="{14F19D09-2D6C-7B46-8CF6-6892B2D45372}" srcOrd="0" destOrd="0" presId="urn:microsoft.com/office/officeart/2005/8/layout/cycle3"/>
+    <dgm:cxn modelId="{87EF58E2-4A2A-8D43-A5E8-77776FDE5383}" type="presOf" srcId="{570875CF-80D1-8C4F-8546-E34D520CD080}" destId="{75B079C5-3075-EE4C-9394-0007AC16B26C}" srcOrd="0" destOrd="0" presId="urn:microsoft.com/office/officeart/2005/8/layout/cycle3"/>
     <dgm:cxn modelId="{0D492091-70E9-204E-B6AB-85A34476817B}" type="presOf" srcId="{2FFA3350-A412-E84A-B7A1-5CA608AFC879}" destId="{4F6FD91A-2276-5040-9CEB-ED702E40C060}" srcOrd="0" destOrd="0" presId="urn:microsoft.com/office/officeart/2005/8/layout/cycle3"/>
-    <dgm:cxn modelId="{87EF58E2-4A2A-8D43-A5E8-77776FDE5383}" type="presOf" srcId="{570875CF-80D1-8C4F-8546-E34D520CD080}" destId="{75B079C5-3075-EE4C-9394-0007AC16B26C}" srcOrd="0" destOrd="0" presId="urn:microsoft.com/office/officeart/2005/8/layout/cycle3"/>
     <dgm:cxn modelId="{9B829CD3-DEE2-974D-A649-DB74A944C5C4}" srcId="{570875CF-80D1-8C4F-8546-E34D520CD080}" destId="{962CDB59-1758-3844-A3F5-E93352C2896A}" srcOrd="0" destOrd="0" parTransId="{636E9687-3B48-604B-9865-01DC6FDA805C}" sibTransId="{C7A74D52-8C91-9445-87CB-932A46E9E295}"/>
     <dgm:cxn modelId="{584404E5-4A33-9343-847E-B7D4E3845D06}" type="presOf" srcId="{C7A74D52-8C91-9445-87CB-932A46E9E295}" destId="{2CF62F29-FFC6-7B4B-B4AC-216A6868B2FE}" srcOrd="0" destOrd="0" presId="urn:microsoft.com/office/officeart/2005/8/layout/cycle3"/>
     <dgm:cxn modelId="{58AAE037-1421-8F45-83EE-C9F7F4C25457}" type="presOf" srcId="{F1414268-F654-B94E-9BEC-747894CC3524}" destId="{94BDDE0D-8522-4C46-A940-0AD8BD045AD0}" srcOrd="0" destOrd="0" presId="urn:microsoft.com/office/officeart/2005/8/layout/cycle3"/>
@@ -8652,7 +8658,7 @@
         <a:p>
           <a:r>
             <a:rPr lang="en-US" dirty="0" smtClean="0"/>
-            <a:t>Package for distribution</a:t>
+            <a:t>Import into XNAT (REST)</a:t>
           </a:r>
           <a:endParaRPr lang="en-US" dirty="0"/>
         </a:p>
@@ -8793,8 +8799,8 @@
     <dgm:cxn modelId="{DC15F46C-FE64-BF44-93B8-632FC7260858}" srcId="{570875CF-80D1-8C4F-8546-E34D520CD080}" destId="{1342B944-6722-9A46-9EA9-13CBD2645CBB}" srcOrd="2" destOrd="0" parTransId="{6E3E5C11-9EB9-204B-A636-143975DF339A}" sibTransId="{3C7339D6-34C8-C74C-A874-6373C23BC8A4}"/>
     <dgm:cxn modelId="{BCE1F26D-0B4D-A14D-8AE1-8CC2BBFB17B9}" type="presOf" srcId="{83EBC9B2-503D-0144-B271-20EA625C42B0}" destId="{8C271668-6F63-7E4D-A129-FE517E34152D}" srcOrd="0" destOrd="0" presId="urn:microsoft.com/office/officeart/2005/8/layout/process4"/>
     <dgm:cxn modelId="{91CF798C-30CF-8E43-AB97-77548002EEDA}" type="presOf" srcId="{570875CF-80D1-8C4F-8546-E34D520CD080}" destId="{BA30E526-F656-034E-8A10-E8695D7476AF}" srcOrd="0" destOrd="0" presId="urn:microsoft.com/office/officeart/2005/8/layout/process4"/>
+    <dgm:cxn modelId="{6F1FFF66-E7B8-0648-817D-B5C37E266907}" srcId="{570875CF-80D1-8C4F-8546-E34D520CD080}" destId="{83EBC9B2-503D-0144-B271-20EA625C42B0}" srcOrd="0" destOrd="0" parTransId="{BF82CCBF-FE2D-A343-AC0F-914C1D84DF33}" sibTransId="{A4592ABE-BC24-8248-805A-F25381BDC137}"/>
     <dgm:cxn modelId="{AC05565D-429C-2E42-9AC6-077409CAD7D3}" type="presOf" srcId="{5E58FA93-9CCE-CF49-AF80-CB7EBCA3D260}" destId="{0976388A-C054-354E-88B6-6BE704957499}" srcOrd="0" destOrd="0" presId="urn:microsoft.com/office/officeart/2005/8/layout/process4"/>
-    <dgm:cxn modelId="{6F1FFF66-E7B8-0648-817D-B5C37E266907}" srcId="{570875CF-80D1-8C4F-8546-E34D520CD080}" destId="{83EBC9B2-503D-0144-B271-20EA625C42B0}" srcOrd="0" destOrd="0" parTransId="{BF82CCBF-FE2D-A343-AC0F-914C1D84DF33}" sibTransId="{A4592ABE-BC24-8248-805A-F25381BDC137}"/>
     <dgm:cxn modelId="{64790135-3786-0B44-853A-45E102AABA46}" srcId="{570875CF-80D1-8C4F-8546-E34D520CD080}" destId="{BBD502F6-BC79-4B4E-AB11-D44315AB8AD9}" srcOrd="4" destOrd="0" parTransId="{3641C9DA-DC54-5647-871E-001F0678233A}" sibTransId="{C06860B2-623A-2049-8331-F98789D45D3E}"/>
     <dgm:cxn modelId="{DD0E2CC5-BE9F-F945-989C-38F11BC57854}" srcId="{570875CF-80D1-8C4F-8546-E34D520CD080}" destId="{5E58FA93-9CCE-CF49-AF80-CB7EBCA3D260}" srcOrd="3" destOrd="0" parTransId="{D800F27E-B92E-9143-94C6-0D32F83B9847}" sibTransId="{08ABDEFA-9143-EC42-88B9-149A1B67019A}"/>
     <dgm:cxn modelId="{29B108B4-165A-D040-B16A-FFAF085E05E9}" type="presOf" srcId="{C8A75E6C-C684-6F40-9499-F69E3AEA390C}" destId="{0406C3E0-84C8-D242-AB69-0A28A04F63EC}" srcOrd="0" destOrd="0" presId="urn:microsoft.com/office/officeart/2005/8/layout/process4"/>
@@ -9809,11 +9815,7 @@
           </a:pPr>
           <a:r>
             <a:rPr lang="en-US" sz="1900" kern="1200" dirty="0" smtClean="0"/>
-            <a:t>Subject</a:t>
-          </a:r>
-          <a:r>
-            <a:rPr lang="en-US" sz="1900" kern="1200" dirty="0" smtClean="0"/>
-            <a:t> trust</a:t>
+            <a:t>Subject trust</a:t>
           </a:r>
           <a:endParaRPr lang="en-US" sz="1900" kern="1200" dirty="0"/>
         </a:p>
@@ -10021,11 +10023,7 @@
           </a:pPr>
           <a:r>
             <a:rPr lang="en-US" sz="1900" kern="1200" dirty="0" smtClean="0"/>
-            <a:t>Patient Health </a:t>
-          </a:r>
-          <a:r>
-            <a:rPr lang="en-US" sz="1900" kern="1200" dirty="0" smtClean="0"/>
-            <a:t>Information </a:t>
+            <a:t>Patient Health Information </a:t>
           </a:r>
           <a:endParaRPr lang="en-US" sz="1900" kern="1200" dirty="0"/>
         </a:p>
@@ -12948,7 +12946,7 @@
           </a:pPr>
           <a:r>
             <a:rPr lang="en-US" sz="1500" kern="1200" dirty="0" smtClean="0"/>
-            <a:t>Package for distribution</a:t>
+            <a:t>Import into XNAT (REST)</a:t>
           </a:r>
           <a:endParaRPr lang="en-US" sz="1500" kern="1200" dirty="0"/>
         </a:p>
@@ -22920,7 +22918,7 @@
             <a:fld id="{60539B86-EF04-44C6-B8E3-7104DDDC854E}" type="datetimeFigureOut">
               <a:rPr lang="en-US" smtClean="0"/>
               <a:pPr/>
-              <a:t>7/23/10</a:t>
+              <a:t>7/26/10</a:t>
             </a:fld>
             <a:endParaRPr lang="en-US"/>
           </a:p>
@@ -25547,8 +25545,8 @@
           </p:cNvPicPr>
           <p:nvPr/>
         </p:nvPicPr>
-        <mc:AlternateContent>
-          <mc:Choice xmlns:ma="http://schemas.microsoft.com/office/mac/drawingml/2008/main" Requires="ma">
+        <mc:AlternateContent xmlns:ma="http://schemas.microsoft.com/office/mac/drawingml/2008/main">
+          <mc:Choice Requires="ma">
             <p:blipFill>
               <a:blip r:embed="rId3"/>
               <a:stretch>
@@ -25556,7 +25554,7 @@
               </a:stretch>
             </p:blipFill>
           </mc:Choice>
-          <mc:Fallback>
+          <mc:Fallback xmlns:p="http://schemas.openxmlformats.org/presentationml/2006/main" xmlns:mv="urn:schemas-microsoft-com:mac:vml" xmlns:mc="http://schemas.openxmlformats.org/markup-compatibility/2006" xmlns:r="http://schemas.openxmlformats.org/officeDocument/2006/relationships" xmlns:a="http://schemas.openxmlformats.org/drawingml/2006/main" xmlns="">
             <p:blipFill>
               <a:blip r:embed="rId4"/>
               <a:stretch>
@@ -25795,7 +25793,7 @@
                 <a:cs typeface="Helvetica" pitchFamily="1" charset="0"/>
                 <a:sym typeface="Helvetica" pitchFamily="1" charset="0"/>
               </a:rPr>
-              <a:t>Ph.D.</a:t>
+              <a:t>Ph.D. </a:t>
             </a:r>
             <a:r>
               <a:rPr lang="en-US" sz="2400" dirty="0" smtClean="0">
@@ -25806,18 +25804,7 @@
                 <a:cs typeface="Helvetica" pitchFamily="1" charset="0"/>
                 <a:sym typeface="Helvetica" pitchFamily="1" charset="0"/>
               </a:rPr>
-              <a:t> </a:t>
-            </a:r>
-            <a:r>
-              <a:rPr lang="en-US" sz="2400" dirty="0" smtClean="0">
-                <a:solidFill>
-                  <a:srgbClr val="7F7F7F"/>
-                </a:solidFill>
-                <a:latin typeface="Helvetica" pitchFamily="1" charset="0"/>
-                <a:cs typeface="Helvetica" pitchFamily="1" charset="0"/>
-                <a:sym typeface="Helvetica" pitchFamily="1" charset="0"/>
-              </a:rPr>
-              <a:t>Canidate</a:t>
+              <a:t>Candidate</a:t>
             </a:r>
             <a:r>
               <a:rPr lang="en-US" sz="2400" baseline="30000" dirty="0" smtClean="0">
@@ -25894,7 +25881,7 @@
                 <a:cs typeface="Helvetica" pitchFamily="1" charset="0"/>
                 <a:sym typeface="Helvetica" pitchFamily="1" charset="0"/>
               </a:rPr>
-              <a:t>– Ph</a:t>
+              <a:t>– Ph.D. </a:t>
             </a:r>
             <a:r>
               <a:rPr lang="en-US" sz="2400" dirty="0" smtClean="0">
@@ -25905,18 +25892,7 @@
                 <a:cs typeface="Helvetica" pitchFamily="1" charset="0"/>
                 <a:sym typeface="Helvetica" pitchFamily="1" charset="0"/>
               </a:rPr>
-              <a:t>.</a:t>
-            </a:r>
-            <a:r>
-              <a:rPr lang="en-US" sz="2400" dirty="0" smtClean="0">
-                <a:solidFill>
-                  <a:srgbClr val="7F7F7F"/>
-                </a:solidFill>
-                <a:latin typeface="Helvetica" pitchFamily="1" charset="0"/>
-                <a:cs typeface="Helvetica" pitchFamily="1" charset="0"/>
-                <a:sym typeface="Helvetica" pitchFamily="1" charset="0"/>
-              </a:rPr>
-              <a:t>D. Canidate</a:t>
+              <a:t>Candidate</a:t>
             </a:r>
             <a:r>
               <a:rPr lang="en-US" sz="2400" baseline="30000" dirty="0" smtClean="0">
@@ -26738,18 +26714,7 @@
                 <a:cs typeface="Helvetica" pitchFamily="1" charset="0"/>
                 <a:sym typeface="Helvetica" pitchFamily="1" charset="0"/>
               </a:rPr>
-              <a:t>The </a:t>
-            </a:r>
-            <a:r>
-              <a:rPr lang="en-US" sz="2800" dirty="0" smtClean="0">
-                <a:solidFill>
-                  <a:srgbClr val="FFFFFF"/>
-                </a:solidFill>
-                <a:latin typeface="Helvetica" pitchFamily="1" charset="0"/>
-                <a:cs typeface="Helvetica" pitchFamily="1" charset="0"/>
-                <a:sym typeface="Helvetica" pitchFamily="1" charset="0"/>
-              </a:rPr>
-              <a:t>Problem</a:t>
+              <a:t>The Problem</a:t>
             </a:r>
             <a:endParaRPr lang="en-US" sz="2800" dirty="0">
               <a:solidFill>
@@ -26812,7 +26777,11 @@
             </a:pPr>
             <a:r>
               <a:rPr lang="en-US" sz="1400" dirty="0" smtClean="0"/>
-              <a:t>Data shared must be HIPAA compliant</a:t>
+              <a:t>Data shared must</a:t>
+            </a:r>
+            <a:r>
+              <a:rPr lang="en-US" sz="1400" dirty="0" smtClean="0"/>
+              <a:t> ensure privacy of subject (HIPAA)</a:t>
             </a:r>
           </a:p>
           <a:p>
@@ -26840,6 +26809,7 @@
               <a:rPr lang="en-US" sz="1400" dirty="0" smtClean="0"/>
               <a:t>Data exists as multiple abstractions, and simply removing it from a single layer is insufficient</a:t>
             </a:r>
+            <a:endParaRPr lang="en-US" sz="1400" dirty="0" smtClean="0"/>
           </a:p>
           <a:p>
             <a:pPr marL="342900" indent="-342900" algn="l" defTabSz="395288">
@@ -26851,23 +26821,15 @@
             </a:pPr>
             <a:r>
               <a:rPr lang="en-US" sz="1400" dirty="0" smtClean="0"/>
-              <a:t>Method is needed to specifically </a:t>
+              <a:t>Tool </a:t>
             </a:r>
             <a:r>
               <a:rPr lang="en-US" sz="1400" dirty="0" smtClean="0"/>
-              <a:t>redact</a:t>
+              <a:t>is needed to specifically redact entire data stack of PHI</a:t>
             </a:r>
             <a:r>
               <a:rPr lang="en-US" sz="1400" dirty="0" smtClean="0"/>
-              <a:t> entire data stack</a:t>
-            </a:r>
-            <a:r>
-              <a:rPr lang="en-US" sz="1400" dirty="0" smtClean="0"/>
-              <a:t> </a:t>
-            </a:r>
-            <a:r>
-              <a:rPr lang="en-US" sz="1400" dirty="0" smtClean="0"/>
-              <a:t>of PHI </a:t>
+              <a:t> and share data</a:t>
             </a:r>
             <a:endParaRPr lang="en-US" sz="1000" dirty="0">
               <a:solidFill>
@@ -27310,18 +27272,7 @@
                   <a:cs typeface="Helvetica" pitchFamily="1" charset="0"/>
                   <a:sym typeface="Helvetica" pitchFamily="1" charset="0"/>
                 </a:rPr>
-                <a:t>Data </a:t>
-              </a:r>
-              <a:r>
-                <a:rPr lang="en-US" sz="2800" dirty="0" smtClean="0">
-                  <a:solidFill>
-                    <a:srgbClr val="FFFFFF"/>
-                  </a:solidFill>
-                  <a:latin typeface="Helvetica" pitchFamily="1" charset="0"/>
-                  <a:cs typeface="Helvetica" pitchFamily="1" charset="0"/>
-                  <a:sym typeface="Helvetica" pitchFamily="1" charset="0"/>
-                </a:rPr>
-                <a:t>Stack</a:t>
+                <a:t>Data Stack</a:t>
               </a:r>
               <a:endParaRPr lang="en-US" sz="2800" dirty="0">
                 <a:solidFill>
@@ -27721,14 +27672,6 @@
               </a:rPr>
               <a:t>Operating Sys</a:t>
             </a:r>
-            <a:endParaRPr lang="en-US" sz="1400" dirty="0" smtClean="0">
-              <a:solidFill>
-                <a:schemeClr val="tx1"/>
-              </a:solidFill>
-              <a:latin typeface="+mn-lt"/>
-              <a:cs typeface="Helvetica" pitchFamily="1" charset="0"/>
-              <a:sym typeface="Helvetica" pitchFamily="1" charset="0"/>
-            </a:endParaRPr>
           </a:p>
           <a:p>
             <a:pPr algn="l" defTabSz="395288">
@@ -27784,8 +27727,8 @@
           </p:cNvPicPr>
           <p:nvPr/>
         </p:nvPicPr>
-        <mc:AlternateContent>
-          <mc:Choice xmlns:ma="http://schemas.microsoft.com/office/mac/drawingml/2008/main" Requires="ma">
+        <mc:AlternateContent xmlns:ma="http://schemas.microsoft.com/office/mac/drawingml/2008/main">
+          <mc:Choice Requires="ma">
             <p:blipFill>
               <a:blip r:embed="rId30"/>
               <a:stretch>
@@ -27793,7 +27736,7 @@
               </a:stretch>
             </p:blipFill>
           </mc:Choice>
-          <mc:Fallback>
+          <mc:Fallback xmlns:p="http://schemas.openxmlformats.org/presentationml/2006/main" xmlns:mv="urn:schemas-microsoft-com:mac:vml" xmlns:mc="http://schemas.openxmlformats.org/markup-compatibility/2006" xmlns:r="http://schemas.openxmlformats.org/officeDocument/2006/relationships" xmlns:a="http://schemas.openxmlformats.org/drawingml/2006/main" xmlns="">
             <p:blipFill>
               <a:blip r:embed="rId31"/>
               <a:stretch>
@@ -28008,51 +27951,7 @@
                 <a:cs typeface="Helvetica" pitchFamily="1" charset="0"/>
                 <a:sym typeface="Helvetica" pitchFamily="1" charset="0"/>
               </a:rPr>
-              <a:t>PHI</a:t>
-            </a:r>
-            <a:r>
-              <a:rPr lang="en-US" sz="2800" dirty="0" smtClean="0">
-                <a:solidFill>
-                  <a:srgbClr val="FFFFFF"/>
-                </a:solidFill>
-                <a:latin typeface="Helvetica" pitchFamily="1" charset="0"/>
-                <a:cs typeface="Helvetica" pitchFamily="1" charset="0"/>
-                <a:sym typeface="Helvetica" pitchFamily="1" charset="0"/>
-              </a:rPr>
-              <a:t> </a:t>
-            </a:r>
-            <a:r>
-              <a:rPr lang="en-US" sz="2800" dirty="0" smtClean="0">
-                <a:solidFill>
-                  <a:srgbClr val="FFFFFF"/>
-                </a:solidFill>
-                <a:latin typeface="Helvetica" pitchFamily="1" charset="0"/>
-                <a:cs typeface="Helvetica" pitchFamily="1" charset="0"/>
-                <a:sym typeface="Helvetica" pitchFamily="1" charset="0"/>
-              </a:rPr>
-              <a:t>Redaction</a:t>
-            </a:r>
-            <a:r>
-              <a:rPr lang="en-US" sz="2800" dirty="0" smtClean="0">
-                <a:solidFill>
-                  <a:srgbClr val="FFFFFF"/>
-                </a:solidFill>
-                <a:latin typeface="Helvetica" pitchFamily="1" charset="0"/>
-                <a:cs typeface="Helvetica" pitchFamily="1" charset="0"/>
-                <a:sym typeface="Helvetica" pitchFamily="1" charset="0"/>
-              </a:rPr>
-              <a:t> </a:t>
-            </a:r>
-            <a:r>
-              <a:rPr lang="en-US" sz="2800" dirty="0" smtClean="0">
-                <a:solidFill>
-                  <a:srgbClr val="FFFFFF"/>
-                </a:solidFill>
-                <a:latin typeface="Helvetica" pitchFamily="1" charset="0"/>
-                <a:cs typeface="Helvetica" pitchFamily="1" charset="0"/>
-                <a:sym typeface="Helvetica" pitchFamily="1" charset="0"/>
-              </a:rPr>
-              <a:t>Engine</a:t>
+              <a:t>PHI Redaction Engine</a:t>
             </a:r>
             <a:endParaRPr lang="en-US" sz="2800" dirty="0">
               <a:solidFill>
@@ -28234,8 +28133,72 @@
             </a:r>
             <a:r>
               <a:rPr lang="en-US" sz="1000" dirty="0" smtClean="0"/>
-              <a:t>, Proceedings of the 8th Annual IEEE SMC Information Assurance Workshop, West Point, New York, June 20-22, 2007.</a:t>
+              <a:t>, Proceedings of the 8th Annual IEEE SMC Information Assurance Workshop, West Point, New York, June 20-22, 2007</a:t>
             </a:r>
+            <a:r>
+              <a:rPr lang="en-US" sz="1000" dirty="0" smtClean="0"/>
+              <a:t>.</a:t>
+            </a:r>
+          </a:p>
+          <a:p>
+            <a:pPr algn="l"/>
+            <a:r>
+              <a:rPr lang="en-US" sz="1000" dirty="0" smtClean="0"/>
+              <a:t>Marcus</a:t>
+            </a:r>
+            <a:r>
+              <a:rPr lang="en-US" sz="1000" dirty="0" smtClean="0"/>
+              <a:t>, D. S, </a:t>
+            </a:r>
+            <a:r>
+              <a:rPr lang="en-US" sz="1000" dirty="0" err="1" smtClean="0"/>
+              <a:t>Oslen</a:t>
+            </a:r>
+            <a:r>
+              <a:rPr lang="en-US" sz="1000" dirty="0" smtClean="0"/>
+              <a:t>, T. R., </a:t>
+            </a:r>
+            <a:r>
+              <a:rPr lang="en-US" sz="1000" dirty="0" err="1" smtClean="0"/>
+              <a:t>Ramaratnam</a:t>
+            </a:r>
+            <a:r>
+              <a:rPr lang="en-US" sz="1000" dirty="0" smtClean="0"/>
+              <a:t>, M. and Buckner, R. L. (2007),  The Extensible </a:t>
+            </a:r>
+            <a:r>
+              <a:rPr lang="en-US" sz="1000" dirty="0" err="1" smtClean="0"/>
+              <a:t>Neuroimaging</a:t>
+            </a:r>
+            <a:r>
+              <a:rPr lang="en-US" sz="1000" dirty="0" smtClean="0"/>
+              <a:t> Archive Toolkit: an informatics platform for managing, exploring, and sharing </a:t>
+            </a:r>
+            <a:r>
+              <a:rPr lang="en-US" sz="1000" dirty="0" err="1" smtClean="0"/>
+              <a:t>neuroimaging</a:t>
+            </a:r>
+            <a:r>
+              <a:rPr lang="en-US" sz="1000" dirty="0" smtClean="0"/>
+              <a:t> data, </a:t>
+            </a:r>
+            <a:r>
+              <a:rPr lang="en-US" sz="1000" i="1" dirty="0" err="1" smtClean="0"/>
+              <a:t>Neuroinformatics</a:t>
+            </a:r>
+            <a:r>
+              <a:rPr lang="en-US" sz="1000" dirty="0" smtClean="0"/>
+              <a:t> </a:t>
+            </a:r>
+            <a:r>
+              <a:rPr lang="en-US" sz="1000" b="1" dirty="0" smtClean="0"/>
+              <a:t>5</a:t>
+            </a:r>
+            <a:r>
+              <a:rPr lang="en-US" sz="1000" dirty="0" smtClean="0"/>
+              <a:t>(1), 11-34. </a:t>
+            </a:r>
+            <a:endParaRPr lang="en-US" sz="1000" dirty="0" smtClean="0"/>
           </a:p>
           <a:p>
             <a:pPr algn="l"/>
@@ -28289,121 +28252,66 @@
                 <a:cs typeface="Helvetica" pitchFamily="1" charset="0"/>
                 <a:sym typeface="Helvetica" pitchFamily="1" charset="0"/>
               </a:rPr>
-              <a:t>Acknowledgments:</a:t>
+              <a:t>Acknowledgments</a:t>
+            </a:r>
+            <a:r>
+              <a:rPr lang="en-US" sz="1600" dirty="0" smtClean="0">
+                <a:solidFill>
+                  <a:schemeClr val="accent2"/>
+                </a:solidFill>
+                <a:latin typeface="Helvetica" pitchFamily="1" charset="0"/>
+                <a:cs typeface="Helvetica" pitchFamily="1" charset="0"/>
+                <a:sym typeface="Helvetica" pitchFamily="1" charset="0"/>
+              </a:rPr>
+              <a:t>:</a:t>
             </a:r>
           </a:p>
           <a:p>
             <a:pPr algn="l" defTabSz="395288"/>
             <a:r>
-              <a:rPr lang="en-US" sz="1400" dirty="0" smtClean="0">
-                <a:solidFill>
-                  <a:schemeClr val="tx1"/>
-                </a:solidFill>
-                <a:latin typeface="Helvetica" pitchFamily="1" charset="0"/>
-                <a:cs typeface="Helvetica" pitchFamily="1" charset="0"/>
-                <a:sym typeface="Helvetica" pitchFamily="1" charset="0"/>
-              </a:rPr>
-              <a:t>William K. Warren Medical Research Institute</a:t>
+              <a:rPr lang="ru-RU" sz="1600" dirty="0" smtClean="0"/>
+              <a:t>We gratefully acknowledge support from the William K. Warren </a:t>
             </a:r>
-            <a:endParaRPr lang="en-US" sz="1400" dirty="0" smtClean="0">
+            <a:r>
+              <a:rPr lang="ru-RU" sz="1600" dirty="0" smtClean="0"/>
+              <a:t>Foundatio</a:t>
+            </a:r>
+            <a:r>
+              <a:rPr lang="en-US" sz="1600" dirty="0" err="1" smtClean="0"/>
+              <a:t>n</a:t>
+            </a:r>
+            <a:r>
+              <a:rPr lang="en-US" sz="1600" dirty="0" smtClean="0"/>
+              <a:t>, </a:t>
+            </a:r>
+            <a:r>
+              <a:rPr lang="en-US" sz="1600" dirty="0" smtClean="0"/>
+              <a:t>T</a:t>
+            </a:r>
+            <a:r>
+              <a:rPr lang="ru-RU" sz="1600" dirty="0" smtClean="0"/>
+              <a:t>he </a:t>
+            </a:r>
+            <a:r>
+              <a:rPr lang="ru-RU" sz="1600" dirty="0" smtClean="0"/>
+              <a:t>National Institute of Health (</a:t>
+            </a:r>
+            <a:r>
+              <a:rPr lang="en-US" sz="1600" dirty="0" smtClean="0"/>
+              <a:t>1R03EB011961-01</a:t>
+            </a:r>
+            <a:r>
+              <a:rPr lang="en-US" sz="1600" dirty="0" smtClean="0"/>
+              <a:t>). </a:t>
+            </a:r>
+            <a:endParaRPr lang="en-US" sz="1600" dirty="0" smtClean="0">
               <a:solidFill>
-                <a:schemeClr val="tx1"/>
+                <a:schemeClr val="accent2"/>
               </a:solidFill>
               <a:latin typeface="Helvetica" pitchFamily="1" charset="0"/>
               <a:cs typeface="Helvetica" pitchFamily="1" charset="0"/>
               <a:sym typeface="Helvetica" pitchFamily="1" charset="0"/>
             </a:endParaRPr>
-          </a:p>
-          <a:p>
-            <a:pPr algn="l" defTabSz="395288"/>
-            <a:r>
-              <a:rPr lang="en-US" sz="1400" dirty="0" smtClean="0">
-                <a:solidFill>
-                  <a:schemeClr val="tx1"/>
-                </a:solidFill>
-                <a:latin typeface="Helvetica" pitchFamily="1" charset="0"/>
-                <a:cs typeface="Helvetica" pitchFamily="1" charset="0"/>
-                <a:sym typeface="Helvetica" pitchFamily="1" charset="0"/>
-              </a:rPr>
-              <a:t>David </a:t>
-            </a:r>
-            <a:r>
-              <a:rPr lang="en-US" sz="1400" dirty="0" smtClean="0">
-                <a:solidFill>
-                  <a:schemeClr val="tx1"/>
-                </a:solidFill>
-                <a:latin typeface="Helvetica" pitchFamily="1" charset="0"/>
-                <a:cs typeface="Helvetica" pitchFamily="1" charset="0"/>
-                <a:sym typeface="Helvetica" pitchFamily="1" charset="0"/>
-              </a:rPr>
-              <a:t>Greer + Patrick </a:t>
-            </a:r>
-            <a:r>
-              <a:rPr lang="en-US" sz="1400" dirty="0" err="1" smtClean="0">
-                <a:solidFill>
-                  <a:schemeClr val="tx1"/>
-                </a:solidFill>
-                <a:latin typeface="Helvetica" pitchFamily="1" charset="0"/>
-                <a:cs typeface="Helvetica" pitchFamily="1" charset="0"/>
-                <a:sym typeface="Helvetica" pitchFamily="1" charset="0"/>
-              </a:rPr>
-              <a:t>Bellgowan</a:t>
-            </a:r>
-            <a:endParaRPr lang="en-US" sz="1400" dirty="0" smtClean="0">
-              <a:solidFill>
-                <a:schemeClr val="tx1"/>
-              </a:solidFill>
-              <a:latin typeface="Helvetica" pitchFamily="1" charset="0"/>
-              <a:cs typeface="Helvetica" pitchFamily="1" charset="0"/>
-              <a:sym typeface="Helvetica" pitchFamily="1" charset="0"/>
-            </a:endParaRPr>
-          </a:p>
-          <a:p>
-            <a:pPr algn="l" defTabSz="395288"/>
-            <a:r>
-              <a:rPr lang="en-US" sz="1400" dirty="0" err="1" smtClean="0">
-                <a:solidFill>
-                  <a:schemeClr val="tx1"/>
-                </a:solidFill>
-                <a:latin typeface="Helvetica" pitchFamily="1" charset="0"/>
-                <a:cs typeface="Helvetica" pitchFamily="1" charset="0"/>
-                <a:sym typeface="Helvetica" pitchFamily="1" charset="0"/>
-              </a:rPr>
-              <a:t>Photobucket</a:t>
-            </a:r>
-            <a:r>
-              <a:rPr lang="en-US" sz="1400" dirty="0" smtClean="0">
-                <a:solidFill>
-                  <a:schemeClr val="tx1"/>
-                </a:solidFill>
-                <a:latin typeface="Helvetica" pitchFamily="1" charset="0"/>
-                <a:cs typeface="Helvetica" pitchFamily="1" charset="0"/>
-                <a:sym typeface="Helvetica" pitchFamily="1" charset="0"/>
-              </a:rPr>
-              <a:t> – </a:t>
-            </a:r>
-            <a:r>
-              <a:rPr lang="en-US" sz="1400" dirty="0" err="1" smtClean="0">
-                <a:solidFill>
-                  <a:schemeClr val="tx1"/>
-                </a:solidFill>
-                <a:latin typeface="Helvetica" pitchFamily="1" charset="0"/>
-                <a:cs typeface="Helvetica" pitchFamily="1" charset="0"/>
-                <a:sym typeface="Helvetica" pitchFamily="1" charset="0"/>
-              </a:rPr>
-              <a:t>mri</a:t>
-            </a:r>
-            <a:r>
-              <a:rPr lang="en-US" sz="1400" dirty="0" smtClean="0">
-                <a:solidFill>
-                  <a:schemeClr val="tx1"/>
-                </a:solidFill>
-                <a:latin typeface="Helvetica" pitchFamily="1" charset="0"/>
-                <a:cs typeface="Helvetica" pitchFamily="1" charset="0"/>
-                <a:sym typeface="Helvetica" pitchFamily="1" charset="0"/>
-              </a:rPr>
-              <a:t> picture</a:t>
-            </a:r>
           </a:p>
           <a:p>
             <a:pPr algn="l" defTabSz="395288"/>
@@ -28458,8 +28366,8 @@
           </p:cNvPicPr>
           <p:nvPr/>
         </p:nvPicPr>
-        <mc:AlternateContent>
-          <mc:Choice xmlns:ma="http://schemas.microsoft.com/office/mac/drawingml/2008/main" Requires="ma">
+        <mc:AlternateContent xmlns:ma="http://schemas.microsoft.com/office/mac/drawingml/2008/main">
+          <mc:Choice Requires="ma">
             <p:blipFill>
               <a:blip r:embed="rId43"/>
               <a:stretch>
@@ -28467,7 +28375,7 @@
               </a:stretch>
             </p:blipFill>
           </mc:Choice>
-          <mc:Fallback>
+          <mc:Fallback xmlns:p="http://schemas.openxmlformats.org/presentationml/2006/main" xmlns:mv="urn:schemas-microsoft-com:mac:vml" xmlns:mc="http://schemas.openxmlformats.org/markup-compatibility/2006" xmlns:r="http://schemas.openxmlformats.org/officeDocument/2006/relationships" xmlns:a="http://schemas.openxmlformats.org/drawingml/2006/main" xmlns="">
             <p:blipFill>
               <a:blip r:embed="rId44"/>
               <a:stretch>
@@ -28522,22 +28430,46 @@
               <a:buChar char="o"/>
             </a:pPr>
             <a:r>
-              <a:rPr lang="en-US" sz="1400" dirty="0" smtClean="0"/>
-              <a:t>Primary </a:t>
-            </a:r>
-            <a:r>
               <a:rPr lang="en-US" sz="1400" dirty="0" err="1" smtClean="0"/>
-              <a:t>neuroimagering</a:t>
+              <a:t>Neuroimaging</a:t>
             </a:r>
             <a:r>
               <a:rPr lang="en-US" sz="1400" dirty="0" smtClean="0"/>
-              <a:t> data management tool </a:t>
+              <a:t> </a:t>
+            </a:r>
+            <a:r>
+              <a:rPr lang="en-US" sz="1400" dirty="0" smtClean="0"/>
+              <a:t>data management</a:t>
+            </a:r>
+            <a:r>
+              <a:rPr lang="en-US" sz="1400" dirty="0" smtClean="0"/>
+              <a:t> </a:t>
+            </a:r>
+            <a:r>
+              <a:rPr lang="en-US" sz="1400" dirty="0" smtClean="0"/>
+              <a:t>platform</a:t>
+            </a:r>
+            <a:r>
+              <a:rPr lang="en-US" sz="1400" dirty="0" smtClean="0"/>
+              <a:t> </a:t>
             </a:r>
             <a:r>
               <a:rPr lang="en-US" sz="1400" dirty="0" smtClean="0">
                 <a:hlinkClick r:id="rId45"/>
               </a:rPr>
-              <a:t>www.nat.org</a:t>
+              <a:t>www</a:t>
+            </a:r>
+            <a:r>
+              <a:rPr lang="en-US" sz="1400" dirty="0" smtClean="0">
+                <a:hlinkClick r:id="rId45"/>
+              </a:rPr>
+              <a:t>.xnat</a:t>
+            </a:r>
+            <a:r>
+              <a:rPr lang="en-US" sz="1400" dirty="0" smtClean="0">
+                <a:hlinkClick r:id="rId45"/>
+              </a:rPr>
+              <a:t>.org</a:t>
             </a:r>
             <a:endParaRPr lang="en-US" sz="1400" dirty="0" smtClean="0"/>
           </a:p>
@@ -28558,7 +28490,27 @@
                 <a:cs typeface="Helvetica" pitchFamily="1" charset="0"/>
                 <a:sym typeface="Helvetica" pitchFamily="1" charset="0"/>
               </a:rPr>
-              <a:t>Java </a:t>
+              <a:t>Combination relational database and file data store</a:t>
+            </a:r>
+          </a:p>
+          <a:p>
+            <a:pPr marL="342900" indent="-342900" algn="l" defTabSz="395288">
+              <a:lnSpc>
+                <a:spcPct val="110000"/>
+              </a:lnSpc>
+              <a:buFont typeface="Courier New"/>
+              <a:buChar char="o"/>
+            </a:pPr>
+            <a:r>
+              <a:rPr lang="en-US" sz="1400" dirty="0" smtClean="0">
+                <a:solidFill>
+                  <a:schemeClr val="tx1"/>
+                </a:solidFill>
+                <a:latin typeface="Helvetica" pitchFamily="1" charset="0"/>
+                <a:cs typeface="Helvetica" pitchFamily="1" charset="0"/>
+                <a:sym typeface="Helvetica" pitchFamily="1" charset="0"/>
+              </a:rPr>
+              <a:t>Remote data processing/execution </a:t>
             </a:r>
             <a:r>
               <a:rPr lang="en-US" sz="1400" dirty="0" err="1" smtClean="0">
@@ -28569,7 +28521,7 @@
                 <a:cs typeface="Helvetica" pitchFamily="1" charset="0"/>
                 <a:sym typeface="Helvetica" pitchFamily="1" charset="0"/>
               </a:rPr>
-              <a:t>middeware</a:t>
+              <a:t>pipepine</a:t>
             </a:r>
             <a:endParaRPr lang="en-US" sz="1400" dirty="0" smtClean="0">
               <a:solidFill>
@@ -28588,17 +28540,31 @@
               <a:buFont typeface="Courier New"/>
               <a:buChar char="o"/>
             </a:pPr>
-            <a:r>
-              <a:rPr lang="en-US" sz="1400" dirty="0" smtClean="0">
-                <a:solidFill>
-                  <a:schemeClr val="tx1"/>
-                </a:solidFill>
-                <a:latin typeface="Helvetica" pitchFamily="1" charset="0"/>
-                <a:cs typeface="Helvetica" pitchFamily="1" charset="0"/>
-                <a:sym typeface="Helvetica" pitchFamily="1" charset="0"/>
-              </a:rPr>
-              <a:t>Blah Blah Blah</a:t>
-            </a:r>
+            <a:endParaRPr lang="en-US" sz="1400" dirty="0" smtClean="0">
+              <a:solidFill>
+                <a:schemeClr val="tx1"/>
+              </a:solidFill>
+              <a:latin typeface="Helvetica" pitchFamily="1" charset="0"/>
+              <a:cs typeface="Helvetica" pitchFamily="1" charset="0"/>
+              <a:sym typeface="Helvetica" pitchFamily="1" charset="0"/>
+            </a:endParaRPr>
+          </a:p>
+          <a:p>
+            <a:pPr marL="342900" indent="-342900" algn="l" defTabSz="395288">
+              <a:lnSpc>
+                <a:spcPct val="110000"/>
+              </a:lnSpc>
+              <a:buFont typeface="Courier New"/>
+              <a:buChar char="o"/>
+            </a:pPr>
+            <a:endParaRPr lang="en-US" sz="1400" dirty="0" smtClean="0">
+              <a:solidFill>
+                <a:schemeClr val="tx1"/>
+              </a:solidFill>
+              <a:latin typeface="Helvetica" pitchFamily="1" charset="0"/>
+              <a:cs typeface="Helvetica" pitchFamily="1" charset="0"/>
+              <a:sym typeface="Helvetica" pitchFamily="1" charset="0"/>
+            </a:endParaRPr>
           </a:p>
           <a:p>
             <a:pPr marL="342900" indent="-342900" algn="l" defTabSz="395288">
@@ -28627,7 +28593,7 @@
         </p:nvSpPr>
         <p:spPr bwMode="auto">
           <a:xfrm>
-            <a:off x="16611600" y="3352800"/>
+            <a:off x="16611600" y="3276600"/>
             <a:ext cx="4724400" cy="762000"/>
           </a:xfrm>
           <a:prstGeom prst="rect">
@@ -28654,23 +28620,8 @@
             </a:pPr>
             <a:r>
               <a:rPr lang="en-US" sz="1400" dirty="0" smtClean="0"/>
-              <a:t>Primary </a:t>
+              <a:t>Jakarta Turbine Web Application Framework / REST Interface</a:t>
             </a:r>
-            <a:r>
-              <a:rPr lang="en-US" sz="1400" dirty="0" err="1" smtClean="0"/>
-              <a:t>neuroimagering</a:t>
-            </a:r>
-            <a:r>
-              <a:rPr lang="en-US" sz="1400" dirty="0" smtClean="0"/>
-              <a:t> data management tool </a:t>
-            </a:r>
-            <a:r>
-              <a:rPr lang="en-US" sz="1400" dirty="0" smtClean="0">
-                <a:hlinkClick r:id="rId45"/>
-              </a:rPr>
-              <a:t>www.nat.org</a:t>
-            </a:r>
-            <a:endParaRPr lang="en-US" sz="1400" dirty="0" smtClean="0"/>
           </a:p>
           <a:p>
             <a:pPr marL="342900" indent="-342900" algn="l" defTabSz="395288">
@@ -28681,35 +28632,9 @@
               <a:buChar char="o"/>
             </a:pPr>
             <a:r>
-              <a:rPr lang="en-US" sz="1400" dirty="0" smtClean="0">
-                <a:solidFill>
-                  <a:schemeClr val="tx1"/>
-                </a:solidFill>
-                <a:latin typeface="Helvetica" pitchFamily="1" charset="0"/>
-                <a:cs typeface="Helvetica" pitchFamily="1" charset="0"/>
-                <a:sym typeface="Helvetica" pitchFamily="1" charset="0"/>
-              </a:rPr>
-              <a:t>Java </a:t>
+              <a:rPr lang="en-US" sz="1400" dirty="0" smtClean="0"/>
+              <a:t>Java with XML configuration files</a:t>
             </a:r>
-            <a:r>
-              <a:rPr lang="en-US" sz="1400" dirty="0" err="1" smtClean="0">
-                <a:solidFill>
-                  <a:schemeClr val="tx1"/>
-                </a:solidFill>
-                <a:latin typeface="Helvetica" pitchFamily="1" charset="0"/>
-                <a:cs typeface="Helvetica" pitchFamily="1" charset="0"/>
-                <a:sym typeface="Helvetica" pitchFamily="1" charset="0"/>
-              </a:rPr>
-              <a:t>middeware</a:t>
-            </a:r>
-            <a:endParaRPr lang="en-US" sz="1400" dirty="0" smtClean="0">
-              <a:solidFill>
-                <a:schemeClr val="tx1"/>
-              </a:solidFill>
-              <a:latin typeface="Helvetica" pitchFamily="1" charset="0"/>
-              <a:cs typeface="Helvetica" pitchFamily="1" charset="0"/>
-              <a:sym typeface="Helvetica" pitchFamily="1" charset="0"/>
-            </a:endParaRPr>
           </a:p>
           <a:p>
             <a:pPr marL="342900" indent="-342900" algn="l" defTabSz="395288">
@@ -28720,16 +28645,29 @@
               <a:buChar char="o"/>
             </a:pPr>
             <a:r>
-              <a:rPr lang="en-US" sz="1400" dirty="0" smtClean="0">
-                <a:solidFill>
-                  <a:schemeClr val="tx1"/>
-                </a:solidFill>
-                <a:latin typeface="Helvetica" pitchFamily="1" charset="0"/>
-                <a:cs typeface="Helvetica" pitchFamily="1" charset="0"/>
-                <a:sym typeface="Helvetica" pitchFamily="1" charset="0"/>
-              </a:rPr>
-              <a:t>Blah Blah Blah</a:t>
+              <a:rPr lang="en-US" sz="1400" dirty="0" err="1" smtClean="0"/>
+              <a:t>PostgreSQL</a:t>
             </a:r>
+            <a:r>
+              <a:rPr lang="en-US" sz="1400" dirty="0" smtClean="0"/>
+              <a:t> database and Unix </a:t>
+            </a:r>
+            <a:r>
+              <a:rPr lang="en-US" sz="1400" dirty="0" err="1" smtClean="0"/>
+              <a:t>filesystem</a:t>
+            </a:r>
+            <a:r>
+              <a:rPr lang="en-US" sz="1400" dirty="0" smtClean="0"/>
+              <a:t> file store </a:t>
+            </a:r>
+            <a:endParaRPr lang="en-US" sz="1400" dirty="0" smtClean="0">
+              <a:solidFill>
+                <a:schemeClr val="tx1"/>
+              </a:solidFill>
+              <a:latin typeface="Helvetica" pitchFamily="1" charset="0"/>
+              <a:cs typeface="Helvetica" pitchFamily="1" charset="0"/>
+              <a:sym typeface="Helvetica" pitchFamily="1" charset="0"/>
+            </a:endParaRPr>
           </a:p>
           <a:p>
             <a:pPr marL="342900" indent="-342900" algn="l" defTabSz="395288">
@@ -29344,7 +29282,7 @@
                 <a:buChar char="o"/>
               </a:pPr>
               <a:r>
-                <a:rPr lang="en-US" sz="1400" dirty="0" err="1" smtClean="0">
+                <a:rPr lang="en-US" sz="1400" dirty="0" smtClean="0">
                   <a:solidFill>
                     <a:schemeClr val="tx1"/>
                   </a:solidFill>
@@ -29352,7 +29290,7 @@
                   <a:cs typeface="Helvetica" pitchFamily="1" charset="0"/>
                   <a:sym typeface="Helvetica" pitchFamily="1" charset="0"/>
                 </a:rPr>
-                <a:t>IBuilds</a:t>
+                <a:t>Builds </a:t>
               </a:r>
               <a:r>
                 <a:rPr lang="en-US" sz="1400" dirty="0" smtClean="0">
@@ -29363,7 +29301,7 @@
                   <a:cs typeface="Helvetica" pitchFamily="1" charset="0"/>
                   <a:sym typeface="Helvetica" pitchFamily="1" charset="0"/>
                 </a:rPr>
-                <a:t> upon XNAT </a:t>
+                <a:t>upon XNAT pipeline </a:t>
               </a:r>
               <a:r>
                 <a:rPr lang="en-US" sz="1400" dirty="0" smtClean="0">
@@ -29374,7 +29312,7 @@
                   <a:cs typeface="Helvetica" pitchFamily="1" charset="0"/>
                   <a:sym typeface="Helvetica" pitchFamily="1" charset="0"/>
                 </a:rPr>
-                <a:t>pipeline interfaces</a:t>
+                <a:t>interface (XML/Java/Python)</a:t>
               </a:r>
             </a:p>
             <a:p>
@@ -29394,7 +29332,18 @@
                   <a:cs typeface="Helvetica" pitchFamily="1" charset="0"/>
                   <a:sym typeface="Helvetica" pitchFamily="1" charset="0"/>
                 </a:rPr>
-                <a:t>Input: selected images, output: redacted images in new project</a:t>
+                <a:t>Input:</a:t>
+              </a:r>
+              <a:r>
+                <a:rPr lang="en-US" sz="1400" dirty="0" smtClean="0">
+                  <a:solidFill>
+                    <a:schemeClr val="tx1"/>
+                  </a:solidFill>
+                  <a:latin typeface="+mn-lt"/>
+                  <a:cs typeface="Helvetica" pitchFamily="1" charset="0"/>
+                  <a:sym typeface="Helvetica" pitchFamily="1" charset="0"/>
+                </a:rPr>
+                <a:t> subjects with full scan data (DICOM)</a:t>
               </a:r>
             </a:p>
             <a:p>
@@ -29414,7 +29363,7 @@
                   <a:cs typeface="Helvetica" pitchFamily="1" charset="0"/>
                   <a:sym typeface="Helvetica" pitchFamily="1" charset="0"/>
                 </a:rPr>
-                <a:t>Java/Python/XML</a:t>
+                <a:t>Output:  mapped subject identifiers coupled to redacted images</a:t>
               </a:r>
               <a:endParaRPr lang="en-US" sz="1400" dirty="0" smtClean="0">
                 <a:solidFill>
@@ -29436,8 +29385,8 @@
           </p:cNvPicPr>
           <p:nvPr/>
         </p:nvPicPr>
-        <mc:AlternateContent>
-          <mc:Choice xmlns:ma="http://schemas.microsoft.com/office/mac/drawingml/2008/main" Requires="ma">
+        <mc:AlternateContent xmlns:ma="http://schemas.microsoft.com/office/mac/drawingml/2008/main">
+          <mc:Choice Requires="ma">
             <p:blipFill>
               <a:blip r:embed="rId46"/>
               <a:stretch>
@@ -29445,7 +29394,7 @@
               </a:stretch>
             </p:blipFill>
           </mc:Choice>
-          <mc:Fallback>
+          <mc:Fallback xmlns:p="http://schemas.openxmlformats.org/presentationml/2006/main" xmlns:mv="urn:schemas-microsoft-com:mac:vml" xmlns:mc="http://schemas.openxmlformats.org/markup-compatibility/2006" xmlns:r="http://schemas.openxmlformats.org/officeDocument/2006/relationships" xmlns:a="http://schemas.openxmlformats.org/drawingml/2006/main" xmlns="">
             <p:blipFill>
               <a:blip r:embed="rId47"/>
               <a:stretch>
@@ -29841,7 +29790,53 @@
                   <a:cs typeface="Bernard MT Condensed"/>
                   <a:sym typeface="Helvetica" pitchFamily="1" charset="0"/>
                 </a:rPr>
-                <a:t> Comprehensive redaction is combination of recursive redaction at the block and file layer, with additional techniques to find and reduce inferred data</a:t>
+                <a:t> Architecture and implementation of issues presented in poster at USENIX Security 09</a:t>
+              </a:r>
+              <a:endParaRPr lang="en-US" sz="1400" dirty="0" smtClean="0">
+                <a:solidFill>
+                  <a:schemeClr val="tx1"/>
+                </a:solidFill>
+                <a:cs typeface="Bernard MT Condensed"/>
+                <a:sym typeface="Helvetica" pitchFamily="1" charset="0"/>
+              </a:endParaRPr>
+            </a:p>
+            <a:p>
+              <a:pPr algn="l" defTabSz="395288">
+                <a:lnSpc>
+                  <a:spcPct val="110000"/>
+                </a:lnSpc>
+                <a:buFont typeface="Courier New"/>
+                <a:buChar char="o"/>
+              </a:pPr>
+              <a:r>
+                <a:rPr lang="en-US" sz="1400" dirty="0" smtClean="0">
+                  <a:solidFill>
+                    <a:schemeClr val="tx1"/>
+                  </a:solidFill>
+                  <a:cs typeface="Bernard MT Condensed"/>
+                  <a:sym typeface="Helvetica" pitchFamily="1" charset="0"/>
+                </a:rPr>
+                <a:t> </a:t>
+              </a:r>
+              <a:r>
+                <a:rPr lang="en-US" sz="1400" dirty="0" smtClean="0">
+                  <a:solidFill>
+                    <a:schemeClr val="tx1"/>
+                  </a:solidFill>
+                  <a:cs typeface="Bernard MT Condensed"/>
+                  <a:sym typeface="Helvetica" pitchFamily="1" charset="0"/>
+                </a:rPr>
+                <a:t>Comprehensive redaction is combination of recursive redaction at the block and file layer, with additional techniques to find and reduce inferred </a:t>
+              </a:r>
+              <a:r>
+                <a:rPr lang="en-US" sz="1400" dirty="0" smtClean="0">
+                  <a:solidFill>
+                    <a:schemeClr val="tx1"/>
+                  </a:solidFill>
+                  <a:cs typeface="Bernard MT Condensed"/>
+                  <a:sym typeface="Helvetica" pitchFamily="1" charset="0"/>
+                </a:rPr>
+                <a:t>data such as DICOM</a:t>
               </a:r>
             </a:p>
             <a:p>
@@ -29860,7 +29855,17 @@
                   <a:cs typeface="Bernard MT Condensed"/>
                   <a:sym typeface="Helvetica" pitchFamily="1" charset="0"/>
                 </a:rPr>
-                <a:t> Based upon body of work and code for legal production</a:t>
+                <a:t> Based upon body of work and code for legal </a:t>
+              </a:r>
+              <a:r>
+                <a:rPr lang="en-US" sz="1400" dirty="0" smtClean="0">
+                  <a:solidFill>
+                    <a:schemeClr val="tx1"/>
+                  </a:solidFill>
+                  <a:cs typeface="Bernard MT Condensed"/>
+                  <a:sym typeface="Helvetica" pitchFamily="1" charset="0"/>
+                </a:rPr>
+                <a:t>production</a:t>
               </a:r>
             </a:p>
             <a:p>
@@ -29879,27 +29884,15 @@
                   <a:cs typeface="Bernard MT Condensed"/>
                   <a:sym typeface="Helvetica" pitchFamily="1" charset="0"/>
                 </a:rPr>
-                <a:t> First step in exploring imaging specific redaction issues</a:t>
+                <a:t> Project is started with goal to finish by August 2011</a:t>
               </a:r>
-            </a:p>
-            <a:p>
-              <a:pPr algn="l" defTabSz="395288">
-                <a:lnSpc>
-                  <a:spcPct val="110000"/>
-                </a:lnSpc>
-                <a:buFont typeface="Courier New"/>
-                <a:buChar char="o"/>
-              </a:pPr>
-              <a:r>
-                <a:rPr lang="en-US" sz="1400" dirty="0" smtClean="0">
-                  <a:solidFill>
-                    <a:schemeClr val="tx1"/>
-                  </a:solidFill>
-                  <a:cs typeface="Bernard MT Condensed"/>
-                  <a:sym typeface="Helvetica" pitchFamily="1" charset="0"/>
-                </a:rPr>
-                <a:t> Expand and bundle current tools, produce integrated tool</a:t>
-              </a:r>
+              <a:endParaRPr lang="en-US" sz="1400" dirty="0" smtClean="0">
+                <a:solidFill>
+                  <a:schemeClr val="tx1"/>
+                </a:solidFill>
+                <a:cs typeface="Bernard MT Condensed"/>
+                <a:sym typeface="Helvetica" pitchFamily="1" charset="0"/>
+              </a:endParaRPr>
             </a:p>
             <a:p>
               <a:pPr marL="228600" indent="-228600" algn="l" defTabSz="395288">

</xml_diff>

<commit_message>
Change paper title, revise poster xnat architecture
</commit_message>
<xml_diff>
--- a/Medaction-XNAT.pptx
+++ b/Medaction-XNAT.pptx
@@ -7070,14 +7070,14 @@
     <dgm:cxn modelId="{9B829CD3-DEE2-974D-A649-DB74A944C5C4}" srcId="{570875CF-80D1-8C4F-8546-E34D520CD080}" destId="{962CDB59-1758-3844-A3F5-E93352C2896A}" srcOrd="0" destOrd="0" parTransId="{636E9687-3B48-604B-9865-01DC6FDA805C}" sibTransId="{C7A74D52-8C91-9445-87CB-932A46E9E295}"/>
     <dgm:cxn modelId="{CFCD4748-C44F-A44A-86B5-EFDB5D5C791A}" srcId="{570875CF-80D1-8C4F-8546-E34D520CD080}" destId="{4B6FA1E4-341F-F54F-A9AE-FAC823CA61BF}" srcOrd="1" destOrd="0" parTransId="{45EBBE08-D49F-9D4C-A02E-7EB95D34C542}" sibTransId="{C49DE4B6-0355-1D42-A290-57E855931C7E}"/>
     <dgm:cxn modelId="{DE40209C-7E6E-B94C-AAA8-DBBF6360253A}" srcId="{570875CF-80D1-8C4F-8546-E34D520CD080}" destId="{DE7B3FAF-673D-6545-93C6-E0EA37A409EB}" srcOrd="2" destOrd="0" parTransId="{318D68B3-A64F-4646-A2F9-3EC8570E425B}" sibTransId="{431BE8E7-3400-3445-AACD-97FD9EC4B202}"/>
+    <dgm:cxn modelId="{FFBEF099-414C-B344-9319-D047E2E8649B}" srcId="{570875CF-80D1-8C4F-8546-E34D520CD080}" destId="{3A69CF19-6CA0-184A-99F1-F42186C8AB42}" srcOrd="3" destOrd="0" parTransId="{316A9CDD-CC60-D04C-B3DF-BE993FD3AFC1}" sibTransId="{00E9698E-12B9-1042-9DCD-9C5555C3A427}"/>
     <dgm:cxn modelId="{4E45CC95-5308-664D-87B9-B0BFC40770DE}" type="presOf" srcId="{570875CF-80D1-8C4F-8546-E34D520CD080}" destId="{21CB5038-B889-3247-8224-ADA196D47C94}" srcOrd="0" destOrd="0" presId="urn:microsoft.com/office/officeart/2005/8/layout/default"/>
-    <dgm:cxn modelId="{FFBEF099-414C-B344-9319-D047E2E8649B}" srcId="{570875CF-80D1-8C4F-8546-E34D520CD080}" destId="{3A69CF19-6CA0-184A-99F1-F42186C8AB42}" srcOrd="3" destOrd="0" parTransId="{316A9CDD-CC60-D04C-B3DF-BE993FD3AFC1}" sibTransId="{00E9698E-12B9-1042-9DCD-9C5555C3A427}"/>
     <dgm:cxn modelId="{BBAADF3B-8C1D-8049-8415-70379F034457}" type="presOf" srcId="{1258307F-C23B-0845-8A22-4C964BEDAA95}" destId="{6C4D2F57-0AEA-3F40-B063-78A0BE7B3A93}" srcOrd="0" destOrd="0" presId="urn:microsoft.com/office/officeart/2005/8/layout/default"/>
     <dgm:cxn modelId="{1F9E765F-555F-CA47-B8A1-2BB6E70F7396}" type="presOf" srcId="{3A69CF19-6CA0-184A-99F1-F42186C8AB42}" destId="{FE3BD15A-F0BA-2B48-A860-76A8115E70CA}" srcOrd="0" destOrd="0" presId="urn:microsoft.com/office/officeart/2005/8/layout/default"/>
     <dgm:cxn modelId="{A750D74D-5F95-6244-946E-5A68242246C0}" srcId="{570875CF-80D1-8C4F-8546-E34D520CD080}" destId="{BBBE487F-D2A6-244C-9C62-9FE6B6CA268F}" srcOrd="5" destOrd="0" parTransId="{F286E376-4CBB-7A4B-9E8D-A4D35BD39A21}" sibTransId="{3E59B615-7152-B544-866B-A073B364E6B0}"/>
     <dgm:cxn modelId="{EB65066B-36A4-8742-8EE8-BAEA5DD072D2}" type="presOf" srcId="{4B6FA1E4-341F-F54F-A9AE-FAC823CA61BF}" destId="{068541F8-9255-D340-9055-486B817A0EC8}" srcOrd="0" destOrd="0" presId="urn:microsoft.com/office/officeart/2005/8/layout/default"/>
+    <dgm:cxn modelId="{FC009F34-4D4E-CD42-8188-4ECA431E7584}" srcId="{570875CF-80D1-8C4F-8546-E34D520CD080}" destId="{4FBE4E8C-6C19-C446-96AD-9AD30F7933C7}" srcOrd="6" destOrd="0" parTransId="{9A9EA27B-8F61-FC43-A908-1C1E09404BDE}" sibTransId="{E3A461EC-285F-5247-BE66-2042CFCBC7C2}"/>
     <dgm:cxn modelId="{0FC2315A-18C4-2B4C-84D3-178FAFCE9550}" type="presOf" srcId="{4FBE4E8C-6C19-C446-96AD-9AD30F7933C7}" destId="{87C014DF-E31B-7541-9F7B-C39943A01063}" srcOrd="0" destOrd="0" presId="urn:microsoft.com/office/officeart/2005/8/layout/default"/>
-    <dgm:cxn modelId="{FC009F34-4D4E-CD42-8188-4ECA431E7584}" srcId="{570875CF-80D1-8C4F-8546-E34D520CD080}" destId="{4FBE4E8C-6C19-C446-96AD-9AD30F7933C7}" srcOrd="6" destOrd="0" parTransId="{9A9EA27B-8F61-FC43-A908-1C1E09404BDE}" sibTransId="{E3A461EC-285F-5247-BE66-2042CFCBC7C2}"/>
     <dgm:cxn modelId="{50966056-0D6C-5A4E-80C2-9B032AA0F2F2}" type="presOf" srcId="{BBBE487F-D2A6-244C-9C62-9FE6B6CA268F}" destId="{393D5D43-738C-F24C-9BD0-EF38F2EC6375}" srcOrd="0" destOrd="0" presId="urn:microsoft.com/office/officeart/2005/8/layout/default"/>
     <dgm:cxn modelId="{0593DC74-F7F8-104A-9040-D6EA62D06E20}" type="presParOf" srcId="{21CB5038-B889-3247-8224-ADA196D47C94}" destId="{FCCA6C2A-826D-A54E-824B-505AD09946D6}" srcOrd="0" destOrd="0" presId="urn:microsoft.com/office/officeart/2005/8/layout/default"/>
     <dgm:cxn modelId="{037B5F22-1537-4B4F-BD25-08F175DC4790}" type="presParOf" srcId="{21CB5038-B889-3247-8224-ADA196D47C94}" destId="{E88849BE-39A5-C044-85FD-4806DA24F4D7}" srcOrd="1" destOrd="0" presId="urn:microsoft.com/office/officeart/2005/8/layout/default"/>
@@ -25554,7 +25554,7 @@
               </a:stretch>
             </p:blipFill>
           </mc:Choice>
-          <mc:Fallback xmlns:p="http://schemas.openxmlformats.org/presentationml/2006/main" xmlns:mv="urn:schemas-microsoft-com:mac:vml" xmlns:mc="http://schemas.openxmlformats.org/markup-compatibility/2006" xmlns:r="http://schemas.openxmlformats.org/officeDocument/2006/relationships" xmlns:a="http://schemas.openxmlformats.org/drawingml/2006/main" xmlns="">
+          <mc:Fallback xmlns:ma="http://schemas.microsoft.com/office/mac/drawingml/2008/main" xmlns="" xmlns:a="http://schemas.openxmlformats.org/drawingml/2006/main" xmlns:r="http://schemas.openxmlformats.org/officeDocument/2006/relationships" xmlns:mc="http://schemas.openxmlformats.org/markup-compatibility/2006" xmlns:mv="urn:schemas-microsoft-com:mac:vml" xmlns:p="http://schemas.openxmlformats.org/presentationml/2006/main">
             <p:blipFill>
               <a:blip r:embed="rId4"/>
               <a:stretch>
@@ -25793,18 +25793,7 @@
                 <a:cs typeface="Helvetica" pitchFamily="1" charset="0"/>
                 <a:sym typeface="Helvetica" pitchFamily="1" charset="0"/>
               </a:rPr>
-              <a:t>Ph.D. </a:t>
-            </a:r>
-            <a:r>
-              <a:rPr lang="en-US" sz="2400" dirty="0" smtClean="0">
-                <a:solidFill>
-                  <a:srgbClr val="7F7F7F"/>
-                </a:solidFill>
-                <a:latin typeface="Helvetica" pitchFamily="1" charset="0"/>
-                <a:cs typeface="Helvetica" pitchFamily="1" charset="0"/>
-                <a:sym typeface="Helvetica" pitchFamily="1" charset="0"/>
-              </a:rPr>
-              <a:t>Candidate</a:t>
+              <a:t>Ph.D. Candidate</a:t>
             </a:r>
             <a:r>
               <a:rPr lang="en-US" sz="2400" baseline="30000" dirty="0" smtClean="0">
@@ -25817,14 +25806,6 @@
               </a:rPr>
               <a:t>2</a:t>
             </a:r>
-            <a:endParaRPr lang="en-US" sz="2400" baseline="30000" dirty="0" smtClean="0">
-              <a:solidFill>
-                <a:srgbClr val="7F7F7F"/>
-              </a:solidFill>
-              <a:latin typeface="Helvetica" pitchFamily="1" charset="0"/>
-              <a:cs typeface="Helvetica" pitchFamily="1" charset="0"/>
-              <a:sym typeface="Helvetica" pitchFamily="1" charset="0"/>
-            </a:endParaRPr>
           </a:p>
           <a:p>
             <a:pPr algn="l" defTabSz="395288"/>
@@ -25881,18 +25862,7 @@
                 <a:cs typeface="Helvetica" pitchFamily="1" charset="0"/>
                 <a:sym typeface="Helvetica" pitchFamily="1" charset="0"/>
               </a:rPr>
-              <a:t>– Ph.D. </a:t>
-            </a:r>
-            <a:r>
-              <a:rPr lang="en-US" sz="2400" dirty="0" smtClean="0">
-                <a:solidFill>
-                  <a:srgbClr val="7F7F7F"/>
-                </a:solidFill>
-                <a:latin typeface="Helvetica" pitchFamily="1" charset="0"/>
-                <a:cs typeface="Helvetica" pitchFamily="1" charset="0"/>
-                <a:sym typeface="Helvetica" pitchFamily="1" charset="0"/>
-              </a:rPr>
-              <a:t>Candidate</a:t>
+              <a:t>– Ph.D. Candidate</a:t>
             </a:r>
             <a:r>
               <a:rPr lang="en-US" sz="2400" baseline="30000" dirty="0" smtClean="0">
@@ -25916,14 +25886,6 @@
               </a:rPr>
               <a:t>  </a:t>
             </a:r>
-            <a:endParaRPr lang="en-US" sz="2400" dirty="0" smtClean="0">
-              <a:solidFill>
-                <a:srgbClr val="7F7F7F"/>
-              </a:solidFill>
-              <a:latin typeface="Helvetica" pitchFamily="1" charset="0"/>
-              <a:cs typeface="Helvetica" pitchFamily="1" charset="0"/>
-              <a:sym typeface="Helvetica" pitchFamily="1" charset="0"/>
-            </a:endParaRPr>
           </a:p>
           <a:p>
             <a:pPr algn="l" defTabSz="395288"/>
@@ -26777,11 +26739,7 @@
             </a:pPr>
             <a:r>
               <a:rPr lang="en-US" sz="1400" dirty="0" smtClean="0"/>
-              <a:t>Data shared must</a:t>
-            </a:r>
-            <a:r>
-              <a:rPr lang="en-US" sz="1400" dirty="0" smtClean="0"/>
-              <a:t> ensure privacy of subject (HIPAA)</a:t>
+              <a:t>Data shared must ensure privacy of subject (HIPAA)</a:t>
             </a:r>
           </a:p>
           <a:p>
@@ -26809,7 +26767,6 @@
               <a:rPr lang="en-US" sz="1400" dirty="0" smtClean="0"/>
               <a:t>Data exists as multiple abstractions, and simply removing it from a single layer is insufficient</a:t>
             </a:r>
-            <a:endParaRPr lang="en-US" sz="1400" dirty="0" smtClean="0"/>
           </a:p>
           <a:p>
             <a:pPr marL="342900" indent="-342900" algn="l" defTabSz="395288">
@@ -26821,15 +26778,7 @@
             </a:pPr>
             <a:r>
               <a:rPr lang="en-US" sz="1400" dirty="0" smtClean="0"/>
-              <a:t>Tool </a:t>
-            </a:r>
-            <a:r>
-              <a:rPr lang="en-US" sz="1400" dirty="0" smtClean="0"/>
-              <a:t>is needed to specifically redact entire data stack of PHI</a:t>
-            </a:r>
-            <a:r>
-              <a:rPr lang="en-US" sz="1400" dirty="0" smtClean="0"/>
-              <a:t> and share data</a:t>
+              <a:t>Tool is needed to specifically redact entire data stack of PHI and share data</a:t>
             </a:r>
             <a:endParaRPr lang="en-US" sz="1000" dirty="0">
               <a:solidFill>
@@ -27736,7 +27685,7 @@
               </a:stretch>
             </p:blipFill>
           </mc:Choice>
-          <mc:Fallback xmlns:p="http://schemas.openxmlformats.org/presentationml/2006/main" xmlns:mv="urn:schemas-microsoft-com:mac:vml" xmlns:mc="http://schemas.openxmlformats.org/markup-compatibility/2006" xmlns:r="http://schemas.openxmlformats.org/officeDocument/2006/relationships" xmlns:a="http://schemas.openxmlformats.org/drawingml/2006/main" xmlns="">
+          <mc:Fallback xmlns:ma="http://schemas.microsoft.com/office/mac/drawingml/2008/main" xmlns="" xmlns:a="http://schemas.openxmlformats.org/drawingml/2006/main" xmlns:r="http://schemas.openxmlformats.org/officeDocument/2006/relationships" xmlns:mc="http://schemas.openxmlformats.org/markup-compatibility/2006" xmlns:mv="urn:schemas-microsoft-com:mac:vml" xmlns:p="http://schemas.openxmlformats.org/presentationml/2006/main">
             <p:blipFill>
               <a:blip r:embed="rId31"/>
               <a:stretch>
@@ -28133,22 +28082,14 @@
             </a:r>
             <a:r>
               <a:rPr lang="en-US" sz="1000" dirty="0" smtClean="0"/>
-              <a:t>, Proceedings of the 8th Annual IEEE SMC Information Assurance Workshop, West Point, New York, June 20-22, 2007</a:t>
-            </a:r>
-            <a:r>
-              <a:rPr lang="en-US" sz="1000" dirty="0" smtClean="0"/>
-              <a:t>.</a:t>
+              <a:t>, Proceedings of the 8th Annual IEEE SMC Information Assurance Workshop, West Point, New York, June 20-22, 2007.</a:t>
             </a:r>
           </a:p>
           <a:p>
             <a:pPr algn="l"/>
             <a:r>
               <a:rPr lang="en-US" sz="1000" dirty="0" smtClean="0"/>
-              <a:t>Marcus</a:t>
-            </a:r>
-            <a:r>
-              <a:rPr lang="en-US" sz="1000" dirty="0" smtClean="0"/>
-              <a:t>, D. S, </a:t>
+              <a:t>Marcus, D. S, </a:t>
             </a:r>
             <a:r>
               <a:rPr lang="en-US" sz="1000" dirty="0" err="1" smtClean="0"/>
@@ -28198,7 +28139,6 @@
               <a:rPr lang="en-US" sz="1000" dirty="0" smtClean="0"/>
               <a:t>(1), 11-34. </a:t>
             </a:r>
-            <a:endParaRPr lang="en-US" sz="1000" dirty="0" smtClean="0"/>
           </a:p>
           <a:p>
             <a:pPr algn="l"/>
@@ -28252,29 +28192,14 @@
                 <a:cs typeface="Helvetica" pitchFamily="1" charset="0"/>
                 <a:sym typeface="Helvetica" pitchFamily="1" charset="0"/>
               </a:rPr>
-              <a:t>Acknowledgments</a:t>
-            </a:r>
-            <a:r>
-              <a:rPr lang="en-US" sz="1600" dirty="0" smtClean="0">
-                <a:solidFill>
-                  <a:schemeClr val="accent2"/>
-                </a:solidFill>
-                <a:latin typeface="Helvetica" pitchFamily="1" charset="0"/>
-                <a:cs typeface="Helvetica" pitchFamily="1" charset="0"/>
-                <a:sym typeface="Helvetica" pitchFamily="1" charset="0"/>
-              </a:rPr>
-              <a:t>:</a:t>
+              <a:t>Acknowledgments:</a:t>
             </a:r>
           </a:p>
           <a:p>
             <a:pPr algn="l" defTabSz="395288"/>
             <a:r>
               <a:rPr lang="ru-RU" sz="1600" dirty="0" smtClean="0"/>
-              <a:t>We gratefully acknowledge support from the William K. Warren </a:t>
-            </a:r>
-            <a:r>
-              <a:rPr lang="ru-RU" sz="1600" dirty="0" smtClean="0"/>
-              <a:t>Foundatio</a:t>
+              <a:t>We gratefully acknowledge support from the William K. Warren Foundatio</a:t>
             </a:r>
             <a:r>
               <a:rPr lang="en-US" sz="1600" dirty="0" err="1" smtClean="0"/>
@@ -28282,27 +28207,15 @@
             </a:r>
             <a:r>
               <a:rPr lang="en-US" sz="1600" dirty="0" smtClean="0"/>
-              <a:t>, </a:t>
+              <a:t>, T</a:t>
+            </a:r>
+            <a:r>
+              <a:rPr lang="ru-RU" sz="1600" dirty="0" smtClean="0"/>
+              <a:t>he National Institute of Health (</a:t>
             </a:r>
             <a:r>
               <a:rPr lang="en-US" sz="1600" dirty="0" smtClean="0"/>
-              <a:t>T</a:t>
-            </a:r>
-            <a:r>
-              <a:rPr lang="ru-RU" sz="1600" dirty="0" smtClean="0"/>
-              <a:t>he </a:t>
-            </a:r>
-            <a:r>
-              <a:rPr lang="ru-RU" sz="1600" dirty="0" smtClean="0"/>
-              <a:t>National Institute of Health (</a:t>
-            </a:r>
-            <a:r>
-              <a:rPr lang="en-US" sz="1600" dirty="0" smtClean="0"/>
-              <a:t>1R03EB011961-01</a:t>
-            </a:r>
-            <a:r>
-              <a:rPr lang="en-US" sz="1600" dirty="0" smtClean="0"/>
-              <a:t>). </a:t>
+              <a:t>1R03EB011961-01). </a:t>
             </a:r>
             <a:endParaRPr lang="en-US" sz="1600" dirty="0" smtClean="0">
               <a:solidFill>
@@ -28375,7 +28288,7 @@
               </a:stretch>
             </p:blipFill>
           </mc:Choice>
-          <mc:Fallback xmlns:p="http://schemas.openxmlformats.org/presentationml/2006/main" xmlns:mv="urn:schemas-microsoft-com:mac:vml" xmlns:mc="http://schemas.openxmlformats.org/markup-compatibility/2006" xmlns:r="http://schemas.openxmlformats.org/officeDocument/2006/relationships" xmlns:a="http://schemas.openxmlformats.org/drawingml/2006/main" xmlns="">
+          <mc:Fallback xmlns:ma="http://schemas.microsoft.com/office/mac/drawingml/2008/main" xmlns="" xmlns:a="http://schemas.openxmlformats.org/drawingml/2006/main" xmlns:r="http://schemas.openxmlformats.org/officeDocument/2006/relationships" xmlns:mc="http://schemas.openxmlformats.org/markup-compatibility/2006" xmlns:mv="urn:schemas-microsoft-com:mac:vml" xmlns:p="http://schemas.openxmlformats.org/presentationml/2006/main">
             <p:blipFill>
               <a:blip r:embed="rId44"/>
               <a:stretch>
@@ -28435,41 +28348,13 @@
             </a:r>
             <a:r>
               <a:rPr lang="en-US" sz="1400" dirty="0" smtClean="0"/>
-              <a:t> </a:t>
-            </a:r>
-            <a:r>
-              <a:rPr lang="en-US" sz="1400" dirty="0" smtClean="0"/>
-              <a:t>data management</a:t>
-            </a:r>
-            <a:r>
-              <a:rPr lang="en-US" sz="1400" dirty="0" smtClean="0"/>
-              <a:t> </a:t>
-            </a:r>
-            <a:r>
-              <a:rPr lang="en-US" sz="1400" dirty="0" smtClean="0"/>
-              <a:t>platform</a:t>
-            </a:r>
-            <a:r>
-              <a:rPr lang="en-US" sz="1400" dirty="0" smtClean="0"/>
-              <a:t> </a:t>
+              <a:t> data management platform </a:t>
             </a:r>
             <a:r>
               <a:rPr lang="en-US" sz="1400" dirty="0" smtClean="0">
                 <a:hlinkClick r:id="rId45"/>
               </a:rPr>
-              <a:t>www</a:t>
-            </a:r>
-            <a:r>
-              <a:rPr lang="en-US" sz="1400" dirty="0" smtClean="0">
-                <a:hlinkClick r:id="rId45"/>
-              </a:rPr>
-              <a:t>.xnat</a:t>
-            </a:r>
-            <a:r>
-              <a:rPr lang="en-US" sz="1400" dirty="0" smtClean="0">
-                <a:hlinkClick r:id="rId45"/>
-              </a:rPr>
-              <a:t>.org</a:t>
+              <a:t>www.xnat.org</a:t>
             </a:r>
             <a:endParaRPr lang="en-US" sz="1400" dirty="0" smtClean="0"/>
           </a:p>
@@ -28937,7 +28822,7 @@
           </p:nvSpPr>
           <p:spPr bwMode="auto">
             <a:xfrm>
-              <a:off x="685800" y="5943600"/>
+              <a:off x="685800" y="5849937"/>
               <a:ext cx="4637087" cy="838200"/>
             </a:xfrm>
             <a:prstGeom prst="rect">
@@ -28971,11 +28856,22 @@
                   <a:cs typeface="Helvetica" pitchFamily="1" charset="0"/>
                   <a:sym typeface="Helvetica" pitchFamily="1" charset="0"/>
                 </a:rPr>
-                <a:t>Logical (not architectural or physical) break down of different storage and display components </a:t>
+                <a:t>Developed as separate </a:t>
+              </a:r>
+              <a:r>
+                <a:rPr lang="en-US" sz="1400" dirty="0" smtClean="0">
+                  <a:solidFill>
+                    <a:schemeClr val="tx1"/>
+                  </a:solidFill>
+                  <a:latin typeface="+mn-lt"/>
+                  <a:cs typeface="Helvetica" pitchFamily="1" charset="0"/>
+                  <a:sym typeface="Helvetica" pitchFamily="1" charset="0"/>
+                </a:rPr>
+                <a:t>units:</a:t>
               </a:r>
             </a:p>
             <a:p>
-              <a:pPr marL="228600" indent="-228600" algn="l" defTabSz="395288">
+              <a:pPr marL="685800" lvl="1" indent="-228600" algn="l" defTabSz="395288">
                 <a:lnSpc>
                   <a:spcPct val="110000"/>
                 </a:lnSpc>
@@ -28991,7 +28887,47 @@
                   <a:cs typeface="Helvetica" pitchFamily="1" charset="0"/>
                   <a:sym typeface="Helvetica" pitchFamily="1" charset="0"/>
                 </a:rPr>
-                <a:t>Bottom up approach to understand what contains PHI</a:t>
+                <a:t>Clients (Turbine/REST/E-mail)</a:t>
+              </a:r>
+            </a:p>
+            <a:p>
+              <a:pPr marL="685800" lvl="1" indent="-228600" algn="l" defTabSz="395288">
+                <a:lnSpc>
+                  <a:spcPct val="110000"/>
+                </a:lnSpc>
+                <a:buFont typeface="Courier New"/>
+                <a:buChar char="o"/>
+              </a:pPr>
+              <a:r>
+                <a:rPr lang="en-US" sz="1400" dirty="0" smtClean="0">
+                  <a:solidFill>
+                    <a:schemeClr val="tx1"/>
+                  </a:solidFill>
+                  <a:latin typeface="+mn-lt"/>
+                  <a:cs typeface="Helvetica" pitchFamily="1" charset="0"/>
+                  <a:sym typeface="Helvetica" pitchFamily="1" charset="0"/>
+                </a:rPr>
+                <a:t>Core (XML configured/Java middleware)</a:t>
+              </a:r>
+            </a:p>
+            <a:p>
+              <a:pPr marL="685800" lvl="1" indent="-228600" algn="l" defTabSz="395288">
+                <a:lnSpc>
+                  <a:spcPct val="110000"/>
+                </a:lnSpc>
+                <a:buFont typeface="Courier New"/>
+                <a:buChar char="o"/>
+              </a:pPr>
+              <a:r>
+                <a:rPr lang="en-US" sz="1400" dirty="0" smtClean="0">
+                  <a:solidFill>
+                    <a:schemeClr val="tx1"/>
+                  </a:solidFill>
+                  <a:latin typeface="+mn-lt"/>
+                  <a:cs typeface="Helvetica" pitchFamily="1" charset="0"/>
+                  <a:sym typeface="Helvetica" pitchFamily="1" charset="0"/>
+                </a:rPr>
+                <a:t>Pipeline (XML configured/implementation independent)</a:t>
               </a:r>
               <a:endParaRPr lang="en-US" sz="1400" dirty="0">
                 <a:solidFill>
@@ -29290,29 +29226,7 @@
                   <a:cs typeface="Helvetica" pitchFamily="1" charset="0"/>
                   <a:sym typeface="Helvetica" pitchFamily="1" charset="0"/>
                 </a:rPr>
-                <a:t>Builds </a:t>
-              </a:r>
-              <a:r>
-                <a:rPr lang="en-US" sz="1400" dirty="0" smtClean="0">
-                  <a:solidFill>
-                    <a:schemeClr val="tx1"/>
-                  </a:solidFill>
-                  <a:latin typeface="+mn-lt"/>
-                  <a:cs typeface="Helvetica" pitchFamily="1" charset="0"/>
-                  <a:sym typeface="Helvetica" pitchFamily="1" charset="0"/>
-                </a:rPr>
-                <a:t>upon XNAT pipeline </a:t>
-              </a:r>
-              <a:r>
-                <a:rPr lang="en-US" sz="1400" dirty="0" smtClean="0">
-                  <a:solidFill>
-                    <a:schemeClr val="tx1"/>
-                  </a:solidFill>
-                  <a:latin typeface="+mn-lt"/>
-                  <a:cs typeface="Helvetica" pitchFamily="1" charset="0"/>
-                  <a:sym typeface="Helvetica" pitchFamily="1" charset="0"/>
-                </a:rPr>
-                <a:t>interface (XML/Java/Python)</a:t>
+                <a:t>Builds upon XNAT pipeline interface (XML/Java/Python)</a:t>
               </a:r>
             </a:p>
             <a:p>
@@ -29332,18 +29246,7 @@
                   <a:cs typeface="Helvetica" pitchFamily="1" charset="0"/>
                   <a:sym typeface="Helvetica" pitchFamily="1" charset="0"/>
                 </a:rPr>
-                <a:t>Input:</a:t>
-              </a:r>
-              <a:r>
-                <a:rPr lang="en-US" sz="1400" dirty="0" smtClean="0">
-                  <a:solidFill>
-                    <a:schemeClr val="tx1"/>
-                  </a:solidFill>
-                  <a:latin typeface="+mn-lt"/>
-                  <a:cs typeface="Helvetica" pitchFamily="1" charset="0"/>
-                  <a:sym typeface="Helvetica" pitchFamily="1" charset="0"/>
-                </a:rPr>
-                <a:t> subjects with full scan data (DICOM)</a:t>
+                <a:t>Input: subjects with full scan data (DICOM)</a:t>
               </a:r>
             </a:p>
             <a:p>
@@ -29365,14 +29268,6 @@
                 </a:rPr>
                 <a:t>Output:  mapped subject identifiers coupled to redacted images</a:t>
               </a:r>
-              <a:endParaRPr lang="en-US" sz="1400" dirty="0" smtClean="0">
-                <a:solidFill>
-                  <a:schemeClr val="tx1"/>
-                </a:solidFill>
-                <a:latin typeface="+mn-lt"/>
-                <a:cs typeface="Helvetica" pitchFamily="1" charset="0"/>
-                <a:sym typeface="Helvetica" pitchFamily="1" charset="0"/>
-              </a:endParaRPr>
             </a:p>
           </p:txBody>
         </p:sp>
@@ -29394,7 +29289,7 @@
               </a:stretch>
             </p:blipFill>
           </mc:Choice>
-          <mc:Fallback xmlns:p="http://schemas.openxmlformats.org/presentationml/2006/main" xmlns:mv="urn:schemas-microsoft-com:mac:vml" xmlns:mc="http://schemas.openxmlformats.org/markup-compatibility/2006" xmlns:r="http://schemas.openxmlformats.org/officeDocument/2006/relationships" xmlns:a="http://schemas.openxmlformats.org/drawingml/2006/main" xmlns="">
+          <mc:Fallback xmlns:ma="http://schemas.microsoft.com/office/mac/drawingml/2008/main" xmlns="" xmlns:a="http://schemas.openxmlformats.org/drawingml/2006/main" xmlns:r="http://schemas.openxmlformats.org/officeDocument/2006/relationships" xmlns:mc="http://schemas.openxmlformats.org/markup-compatibility/2006" xmlns:mv="urn:schemas-microsoft-com:mac:vml" xmlns:p="http://schemas.openxmlformats.org/presentationml/2006/main">
             <p:blipFill>
               <a:blip r:embed="rId47"/>
               <a:stretch>
@@ -29792,13 +29687,6 @@
                 </a:rPr>
                 <a:t> Architecture and implementation of issues presented in poster at USENIX Security 09</a:t>
               </a:r>
-              <a:endParaRPr lang="en-US" sz="1400" dirty="0" smtClean="0">
-                <a:solidFill>
-                  <a:schemeClr val="tx1"/>
-                </a:solidFill>
-                <a:cs typeface="Bernard MT Condensed"/>
-                <a:sym typeface="Helvetica" pitchFamily="1" charset="0"/>
-              </a:endParaRPr>
             </a:p>
             <a:p>
               <a:pPr algn="l" defTabSz="395288">
@@ -29816,27 +29704,7 @@
                   <a:cs typeface="Bernard MT Condensed"/>
                   <a:sym typeface="Helvetica" pitchFamily="1" charset="0"/>
                 </a:rPr>
-                <a:t> </a:t>
-              </a:r>
-              <a:r>
-                <a:rPr lang="en-US" sz="1400" dirty="0" smtClean="0">
-                  <a:solidFill>
-                    <a:schemeClr val="tx1"/>
-                  </a:solidFill>
-                  <a:cs typeface="Bernard MT Condensed"/>
-                  <a:sym typeface="Helvetica" pitchFamily="1" charset="0"/>
-                </a:rPr>
-                <a:t>Comprehensive redaction is combination of recursive redaction at the block and file layer, with additional techniques to find and reduce inferred </a:t>
-              </a:r>
-              <a:r>
-                <a:rPr lang="en-US" sz="1400" dirty="0" smtClean="0">
-                  <a:solidFill>
-                    <a:schemeClr val="tx1"/>
-                  </a:solidFill>
-                  <a:cs typeface="Bernard MT Condensed"/>
-                  <a:sym typeface="Helvetica" pitchFamily="1" charset="0"/>
-                </a:rPr>
-                <a:t>data such as DICOM</a:t>
+                <a:t> Comprehensive redaction is combination of recursive redaction at the block and file layer, with additional techniques to find and reduce inferred data such as DICOM</a:t>
               </a:r>
             </a:p>
             <a:p>
@@ -29855,17 +29723,7 @@
                   <a:cs typeface="Bernard MT Condensed"/>
                   <a:sym typeface="Helvetica" pitchFamily="1" charset="0"/>
                 </a:rPr>
-                <a:t> Based upon body of work and code for legal </a:t>
-              </a:r>
-              <a:r>
-                <a:rPr lang="en-US" sz="1400" dirty="0" smtClean="0">
-                  <a:solidFill>
-                    <a:schemeClr val="tx1"/>
-                  </a:solidFill>
-                  <a:cs typeface="Bernard MT Condensed"/>
-                  <a:sym typeface="Helvetica" pitchFamily="1" charset="0"/>
-                </a:rPr>
-                <a:t>production</a:t>
+                <a:t> Based upon body of work and code for legal production</a:t>
               </a:r>
             </a:p>
             <a:p>
@@ -29886,13 +29744,6 @@
                 </a:rPr>
                 <a:t> Project is started with goal to finish by August 2011</a:t>
               </a:r>
-              <a:endParaRPr lang="en-US" sz="1400" dirty="0" smtClean="0">
-                <a:solidFill>
-                  <a:schemeClr val="tx1"/>
-                </a:solidFill>
-                <a:cs typeface="Bernard MT Condensed"/>
-                <a:sym typeface="Helvetica" pitchFamily="1" charset="0"/>
-              </a:endParaRPr>
             </a:p>
             <a:p>
               <a:pPr marL="228600" indent="-228600" algn="l" defTabSz="395288">

</xml_diff>

<commit_message>
minor changes to poster wording
</commit_message>
<xml_diff>
--- a/Medaction-XNAT.pptx
+++ b/Medaction-XNAT.pptx
@@ -7070,14 +7070,14 @@
     <dgm:cxn modelId="{9B829CD3-DEE2-974D-A649-DB74A944C5C4}" srcId="{570875CF-80D1-8C4F-8546-E34D520CD080}" destId="{962CDB59-1758-3844-A3F5-E93352C2896A}" srcOrd="0" destOrd="0" parTransId="{636E9687-3B48-604B-9865-01DC6FDA805C}" sibTransId="{C7A74D52-8C91-9445-87CB-932A46E9E295}"/>
     <dgm:cxn modelId="{CFCD4748-C44F-A44A-86B5-EFDB5D5C791A}" srcId="{570875CF-80D1-8C4F-8546-E34D520CD080}" destId="{4B6FA1E4-341F-F54F-A9AE-FAC823CA61BF}" srcOrd="1" destOrd="0" parTransId="{45EBBE08-D49F-9D4C-A02E-7EB95D34C542}" sibTransId="{C49DE4B6-0355-1D42-A290-57E855931C7E}"/>
     <dgm:cxn modelId="{DE40209C-7E6E-B94C-AAA8-DBBF6360253A}" srcId="{570875CF-80D1-8C4F-8546-E34D520CD080}" destId="{DE7B3FAF-673D-6545-93C6-E0EA37A409EB}" srcOrd="2" destOrd="0" parTransId="{318D68B3-A64F-4646-A2F9-3EC8570E425B}" sibTransId="{431BE8E7-3400-3445-AACD-97FD9EC4B202}"/>
+    <dgm:cxn modelId="{4E45CC95-5308-664D-87B9-B0BFC40770DE}" type="presOf" srcId="{570875CF-80D1-8C4F-8546-E34D520CD080}" destId="{21CB5038-B889-3247-8224-ADA196D47C94}" srcOrd="0" destOrd="0" presId="urn:microsoft.com/office/officeart/2005/8/layout/default"/>
     <dgm:cxn modelId="{FFBEF099-414C-B344-9319-D047E2E8649B}" srcId="{570875CF-80D1-8C4F-8546-E34D520CD080}" destId="{3A69CF19-6CA0-184A-99F1-F42186C8AB42}" srcOrd="3" destOrd="0" parTransId="{316A9CDD-CC60-D04C-B3DF-BE993FD3AFC1}" sibTransId="{00E9698E-12B9-1042-9DCD-9C5555C3A427}"/>
-    <dgm:cxn modelId="{4E45CC95-5308-664D-87B9-B0BFC40770DE}" type="presOf" srcId="{570875CF-80D1-8C4F-8546-E34D520CD080}" destId="{21CB5038-B889-3247-8224-ADA196D47C94}" srcOrd="0" destOrd="0" presId="urn:microsoft.com/office/officeart/2005/8/layout/default"/>
     <dgm:cxn modelId="{BBAADF3B-8C1D-8049-8415-70379F034457}" type="presOf" srcId="{1258307F-C23B-0845-8A22-4C964BEDAA95}" destId="{6C4D2F57-0AEA-3F40-B063-78A0BE7B3A93}" srcOrd="0" destOrd="0" presId="urn:microsoft.com/office/officeart/2005/8/layout/default"/>
     <dgm:cxn modelId="{1F9E765F-555F-CA47-B8A1-2BB6E70F7396}" type="presOf" srcId="{3A69CF19-6CA0-184A-99F1-F42186C8AB42}" destId="{FE3BD15A-F0BA-2B48-A860-76A8115E70CA}" srcOrd="0" destOrd="0" presId="urn:microsoft.com/office/officeart/2005/8/layout/default"/>
     <dgm:cxn modelId="{A750D74D-5F95-6244-946E-5A68242246C0}" srcId="{570875CF-80D1-8C4F-8546-E34D520CD080}" destId="{BBBE487F-D2A6-244C-9C62-9FE6B6CA268F}" srcOrd="5" destOrd="0" parTransId="{F286E376-4CBB-7A4B-9E8D-A4D35BD39A21}" sibTransId="{3E59B615-7152-B544-866B-A073B364E6B0}"/>
     <dgm:cxn modelId="{EB65066B-36A4-8742-8EE8-BAEA5DD072D2}" type="presOf" srcId="{4B6FA1E4-341F-F54F-A9AE-FAC823CA61BF}" destId="{068541F8-9255-D340-9055-486B817A0EC8}" srcOrd="0" destOrd="0" presId="urn:microsoft.com/office/officeart/2005/8/layout/default"/>
+    <dgm:cxn modelId="{0FC2315A-18C4-2B4C-84D3-178FAFCE9550}" type="presOf" srcId="{4FBE4E8C-6C19-C446-96AD-9AD30F7933C7}" destId="{87C014DF-E31B-7541-9F7B-C39943A01063}" srcOrd="0" destOrd="0" presId="urn:microsoft.com/office/officeart/2005/8/layout/default"/>
     <dgm:cxn modelId="{FC009F34-4D4E-CD42-8188-4ECA431E7584}" srcId="{570875CF-80D1-8C4F-8546-E34D520CD080}" destId="{4FBE4E8C-6C19-C446-96AD-9AD30F7933C7}" srcOrd="6" destOrd="0" parTransId="{9A9EA27B-8F61-FC43-A908-1C1E09404BDE}" sibTransId="{E3A461EC-285F-5247-BE66-2042CFCBC7C2}"/>
-    <dgm:cxn modelId="{0FC2315A-18C4-2B4C-84D3-178FAFCE9550}" type="presOf" srcId="{4FBE4E8C-6C19-C446-96AD-9AD30F7933C7}" destId="{87C014DF-E31B-7541-9F7B-C39943A01063}" srcOrd="0" destOrd="0" presId="urn:microsoft.com/office/officeart/2005/8/layout/default"/>
     <dgm:cxn modelId="{50966056-0D6C-5A4E-80C2-9B032AA0F2F2}" type="presOf" srcId="{BBBE487F-D2A6-244C-9C62-9FE6B6CA268F}" destId="{393D5D43-738C-F24C-9BD0-EF38F2EC6375}" srcOrd="0" destOrd="0" presId="urn:microsoft.com/office/officeart/2005/8/layout/default"/>
     <dgm:cxn modelId="{0593DC74-F7F8-104A-9040-D6EA62D06E20}" type="presParOf" srcId="{21CB5038-B889-3247-8224-ADA196D47C94}" destId="{FCCA6C2A-826D-A54E-824B-505AD09946D6}" srcOrd="0" destOrd="0" presId="urn:microsoft.com/office/officeart/2005/8/layout/default"/>
     <dgm:cxn modelId="{037B5F22-1537-4B4F-BD25-08F175DC4790}" type="presParOf" srcId="{21CB5038-B889-3247-8224-ADA196D47C94}" destId="{E88849BE-39A5-C044-85FD-4806DA24F4D7}" srcOrd="1" destOrd="0" presId="urn:microsoft.com/office/officeart/2005/8/layout/default"/>
@@ -22918,7 +22918,7 @@
             <a:fld id="{60539B86-EF04-44C6-B8E3-7104DDDC854E}" type="datetimeFigureOut">
               <a:rPr lang="en-US" smtClean="0"/>
               <a:pPr/>
-              <a:t>7/26/10</a:t>
+              <a:t>8/6/10</a:t>
             </a:fld>
             <a:endParaRPr lang="en-US"/>
           </a:p>
@@ -25554,7 +25554,7 @@
               </a:stretch>
             </p:blipFill>
           </mc:Choice>
-          <mc:Fallback xmlns:ma="http://schemas.microsoft.com/office/mac/drawingml/2008/main" xmlns="" xmlns:a="http://schemas.openxmlformats.org/drawingml/2006/main" xmlns:r="http://schemas.openxmlformats.org/officeDocument/2006/relationships" xmlns:mc="http://schemas.openxmlformats.org/markup-compatibility/2006" xmlns:mv="urn:schemas-microsoft-com:mac:vml" xmlns:p="http://schemas.openxmlformats.org/presentationml/2006/main">
+          <mc:Fallback xmlns:p="http://schemas.openxmlformats.org/presentationml/2006/main" xmlns:mv="urn:schemas-microsoft-com:mac:vml" xmlns:mc="http://schemas.openxmlformats.org/markup-compatibility/2006" xmlns:r="http://schemas.openxmlformats.org/officeDocument/2006/relationships" xmlns:a="http://schemas.openxmlformats.org/drawingml/2006/main" xmlns="" xmlns:ma="http://schemas.microsoft.com/office/mac/drawingml/2008/main">
             <p:blipFill>
               <a:blip r:embed="rId4"/>
               <a:stretch>
@@ -27685,7 +27685,7 @@
               </a:stretch>
             </p:blipFill>
           </mc:Choice>
-          <mc:Fallback xmlns:ma="http://schemas.microsoft.com/office/mac/drawingml/2008/main" xmlns="" xmlns:a="http://schemas.openxmlformats.org/drawingml/2006/main" xmlns:r="http://schemas.openxmlformats.org/officeDocument/2006/relationships" xmlns:mc="http://schemas.openxmlformats.org/markup-compatibility/2006" xmlns:mv="urn:schemas-microsoft-com:mac:vml" xmlns:p="http://schemas.openxmlformats.org/presentationml/2006/main">
+          <mc:Fallback xmlns:p="http://schemas.openxmlformats.org/presentationml/2006/main" xmlns:mv="urn:schemas-microsoft-com:mac:vml" xmlns:mc="http://schemas.openxmlformats.org/markup-compatibility/2006" xmlns:r="http://schemas.openxmlformats.org/officeDocument/2006/relationships" xmlns:a="http://schemas.openxmlformats.org/drawingml/2006/main" xmlns="" xmlns:ma="http://schemas.microsoft.com/office/mac/drawingml/2008/main">
             <p:blipFill>
               <a:blip r:embed="rId31"/>
               <a:stretch>
@@ -28207,11 +28207,19 @@
             </a:r>
             <a:r>
               <a:rPr lang="en-US" sz="1600" dirty="0" smtClean="0"/>
-              <a:t>, T</a:t>
+              <a:t>, and </a:t>
+            </a:r>
+            <a:r>
+              <a:rPr lang="en-US" sz="1600" dirty="0" err="1" smtClean="0"/>
+              <a:t>t</a:t>
             </a:r>
             <a:r>
               <a:rPr lang="ru-RU" sz="1600" dirty="0" smtClean="0"/>
-              <a:t>he National Institute of Health (</a:t>
+              <a:t>he </a:t>
+            </a:r>
+            <a:r>
+              <a:rPr lang="ru-RU" sz="1600" dirty="0" smtClean="0"/>
+              <a:t>National Institute of Health (</a:t>
             </a:r>
             <a:r>
               <a:rPr lang="en-US" sz="1600" dirty="0" smtClean="0"/>
@@ -28288,7 +28296,7 @@
               </a:stretch>
             </p:blipFill>
           </mc:Choice>
-          <mc:Fallback xmlns:ma="http://schemas.microsoft.com/office/mac/drawingml/2008/main" xmlns="" xmlns:a="http://schemas.openxmlformats.org/drawingml/2006/main" xmlns:r="http://schemas.openxmlformats.org/officeDocument/2006/relationships" xmlns:mc="http://schemas.openxmlformats.org/markup-compatibility/2006" xmlns:mv="urn:schemas-microsoft-com:mac:vml" xmlns:p="http://schemas.openxmlformats.org/presentationml/2006/main">
+          <mc:Fallback xmlns:p="http://schemas.openxmlformats.org/presentationml/2006/main" xmlns:mv="urn:schemas-microsoft-com:mac:vml" xmlns:mc="http://schemas.openxmlformats.org/markup-compatibility/2006" xmlns:r="http://schemas.openxmlformats.org/officeDocument/2006/relationships" xmlns:a="http://schemas.openxmlformats.org/drawingml/2006/main" xmlns="" xmlns:ma="http://schemas.microsoft.com/office/mac/drawingml/2008/main">
             <p:blipFill>
               <a:blip r:embed="rId44"/>
               <a:stretch>
@@ -28856,18 +28864,7 @@
                   <a:cs typeface="Helvetica" pitchFamily="1" charset="0"/>
                   <a:sym typeface="Helvetica" pitchFamily="1" charset="0"/>
                 </a:rPr>
-                <a:t>Developed as separate </a:t>
-              </a:r>
-              <a:r>
-                <a:rPr lang="en-US" sz="1400" dirty="0" smtClean="0">
-                  <a:solidFill>
-                    <a:schemeClr val="tx1"/>
-                  </a:solidFill>
-                  <a:latin typeface="+mn-lt"/>
-                  <a:cs typeface="Helvetica" pitchFamily="1" charset="0"/>
-                  <a:sym typeface="Helvetica" pitchFamily="1" charset="0"/>
-                </a:rPr>
-                <a:t>units:</a:t>
+                <a:t>Developed as separate units:</a:t>
               </a:r>
             </a:p>
             <a:p>
@@ -29289,7 +29286,7 @@
               </a:stretch>
             </p:blipFill>
           </mc:Choice>
-          <mc:Fallback xmlns:ma="http://schemas.microsoft.com/office/mac/drawingml/2008/main" xmlns="" xmlns:a="http://schemas.openxmlformats.org/drawingml/2006/main" xmlns:r="http://schemas.openxmlformats.org/officeDocument/2006/relationships" xmlns:mc="http://schemas.openxmlformats.org/markup-compatibility/2006" xmlns:mv="urn:schemas-microsoft-com:mac:vml" xmlns:p="http://schemas.openxmlformats.org/presentationml/2006/main">
+          <mc:Fallback xmlns:p="http://schemas.openxmlformats.org/presentationml/2006/main" xmlns:mv="urn:schemas-microsoft-com:mac:vml" xmlns:mc="http://schemas.openxmlformats.org/markup-compatibility/2006" xmlns:r="http://schemas.openxmlformats.org/officeDocument/2006/relationships" xmlns:a="http://schemas.openxmlformats.org/drawingml/2006/main" xmlns="" xmlns:ma="http://schemas.microsoft.com/office/mac/drawingml/2008/main">
             <p:blipFill>
               <a:blip r:embed="rId47"/>
               <a:stretch>

</xml_diff>

<commit_message>
Poster - change institute to institutes
</commit_message>
<xml_diff>
--- a/Medaction-XNAT.pptx
+++ b/Medaction-XNAT.pptx
@@ -26726,7 +26726,23 @@
             </a:pPr>
             <a:r>
               <a:rPr lang="en-US" sz="1400" dirty="0" smtClean="0"/>
-              <a:t>Large-scale studies have huge amounts of data (1PB/3Yrs)</a:t>
+              <a:t>Large-scale studies have huge amounts of data</a:t>
+            </a:r>
+            <a:r>
+              <a:rPr lang="en-US" sz="1400" dirty="0" smtClean="0"/>
+              <a:t> </a:t>
+            </a:r>
+            <a:r>
+              <a:rPr lang="en-US" sz="1400" dirty="0" smtClean="0"/>
+              <a:t>(</a:t>
+            </a:r>
+            <a:r>
+              <a:rPr lang="en-US" sz="1400" dirty="0" smtClean="0"/>
+              <a:t>1PB</a:t>
+            </a:r>
+            <a:r>
+              <a:rPr lang="en-US" sz="1400" dirty="0" smtClean="0"/>
+              <a:t>/3Yrs)</a:t>
             </a:r>
           </a:p>
           <a:p>
@@ -26754,6 +26770,7 @@
               <a:rPr lang="en-US" sz="1400" dirty="0" smtClean="0"/>
               <a:t>Inter-organizational collaboration must be easy</a:t>
             </a:r>
+            <a:endParaRPr lang="en-US" sz="1400" dirty="0" smtClean="0"/>
           </a:p>
           <a:p>
             <a:pPr marL="342900" indent="-342900" algn="l" defTabSz="395288">
@@ -26765,7 +26782,15 @@
             </a:pPr>
             <a:r>
               <a:rPr lang="en-US" sz="1400" dirty="0" smtClean="0"/>
-              <a:t>Data exists as multiple abstractions, and simply removing it from a single layer is insufficient</a:t>
+              <a:t>PHI</a:t>
+            </a:r>
+            <a:r>
+              <a:rPr lang="en-US" sz="1400" dirty="0" smtClean="0"/>
+              <a:t> </a:t>
+            </a:r>
+            <a:r>
+              <a:rPr lang="en-US" sz="1400" dirty="0" smtClean="0"/>
+              <a:t>exists as multiple abstractions, and simply removing it from a single layer is insufficient</a:t>
             </a:r>
           </a:p>
           <a:p>
@@ -28219,7 +28244,23 @@
             </a:r>
             <a:r>
               <a:rPr lang="ru-RU" sz="1600" dirty="0" smtClean="0"/>
-              <a:t>National Institute of Health (</a:t>
+              <a:t>National </a:t>
+            </a:r>
+            <a:r>
+              <a:rPr lang="ru-RU" sz="1600" dirty="0" smtClean="0"/>
+              <a:t>Institute</a:t>
+            </a:r>
+            <a:r>
+              <a:rPr lang="en-US" sz="1600" dirty="0" err="1" smtClean="0"/>
+              <a:t>s</a:t>
+            </a:r>
+            <a:r>
+              <a:rPr lang="ru-RU" sz="1600" dirty="0" smtClean="0"/>
+              <a:t> </a:t>
+            </a:r>
+            <a:r>
+              <a:rPr lang="ru-RU" sz="1600" dirty="0" smtClean="0"/>
+              <a:t>of Health (</a:t>
             </a:r>
             <a:r>
               <a:rPr lang="en-US" sz="1600" dirty="0" smtClean="0"/>

</xml_diff>